<commit_message>
Add static specifier, rename UPREC to PBITS
</commit_message>
<xml_diff>
--- a/doc/modules.pptx
+++ b/doc/modules.pptx
@@ -104,6 +104,22 @@
       </a:defRPr>
     </a:lvl9pPr>
   </p:defaultTextStyle>
+  <p:extLst>
+    <p:ext uri="{EFAFB233-063F-42B5-8137-9DF3F51BA10A}">
+      <p15:sldGuideLst xmlns:p15="http://schemas.microsoft.com/office/powerpoint/2012/main">
+        <p15:guide id="1" orient="horz" pos="2160">
+          <p15:clr>
+            <a:srgbClr val="A4A3A4"/>
+          </p15:clr>
+        </p15:guide>
+        <p15:guide id="2" pos="2880">
+          <p15:clr>
+            <a:srgbClr val="A4A3A4"/>
+          </p15:clr>
+        </p15:guide>
+      </p15:sldGuideLst>
+    </p:ext>
+  </p:extLst>
 </p:presentation>
 </file>
 
@@ -145,10 +161,9 @@
           <a:lstStyle/>
           <a:p>
             <a:r>
-              <a:rPr lang="en-US" smtClean="0"/>
+              <a:rPr lang="en-US"/>
               <a:t>Click to edit Master title style</a:t>
             </a:r>
-            <a:endParaRPr lang="en-US"/>
           </a:p>
         </p:txBody>
       </p:sp>
@@ -264,10 +279,9 @@
           </a:lstStyle>
           <a:p>
             <a:r>
-              <a:rPr lang="en-US" smtClean="0"/>
+              <a:rPr lang="en-US"/>
               <a:t>Click to edit Master subtitle style</a:t>
             </a:r>
-            <a:endParaRPr lang="en-US"/>
           </a:p>
         </p:txBody>
       </p:sp>
@@ -288,7 +302,7 @@
           <a:p>
             <a:fld id="{4752DE93-9BB2-40E0-8369-F9D2ECE13C34}" type="datetimeFigureOut">
               <a:rPr lang="en-US" smtClean="0"/>
-              <a:t>6/24/2016</a:t>
+              <a:t>3/12/2018</a:t>
             </a:fld>
             <a:endParaRPr lang="en-US"/>
           </a:p>
@@ -382,10 +396,9 @@
           <a:lstStyle/>
           <a:p>
             <a:r>
-              <a:rPr lang="en-US" smtClean="0"/>
+              <a:rPr lang="en-US"/>
               <a:t>Click to edit Master title style</a:t>
             </a:r>
-            <a:endParaRPr lang="en-US"/>
           </a:p>
         </p:txBody>
       </p:sp>
@@ -406,38 +419,37 @@
           <a:p>
             <a:pPr lvl="0"/>
             <a:r>
-              <a:rPr lang="en-US" smtClean="0"/>
+              <a:rPr lang="en-US"/>
               <a:t>Click to edit Master text styles</a:t>
             </a:r>
           </a:p>
           <a:p>
             <a:pPr lvl="1"/>
             <a:r>
-              <a:rPr lang="en-US" smtClean="0"/>
+              <a:rPr lang="en-US"/>
               <a:t>Second level</a:t>
             </a:r>
           </a:p>
           <a:p>
             <a:pPr lvl="2"/>
             <a:r>
-              <a:rPr lang="en-US" smtClean="0"/>
+              <a:rPr lang="en-US"/>
               <a:t>Third level</a:t>
             </a:r>
           </a:p>
           <a:p>
             <a:pPr lvl="3"/>
             <a:r>
-              <a:rPr lang="en-US" smtClean="0"/>
+              <a:rPr lang="en-US"/>
               <a:t>Fourth level</a:t>
             </a:r>
           </a:p>
           <a:p>
             <a:pPr lvl="4"/>
             <a:r>
-              <a:rPr lang="en-US" smtClean="0"/>
+              <a:rPr lang="en-US"/>
               <a:t>Fifth level</a:t>
             </a:r>
-            <a:endParaRPr lang="en-US"/>
           </a:p>
         </p:txBody>
       </p:sp>
@@ -458,7 +470,7 @@
           <a:p>
             <a:fld id="{4752DE93-9BB2-40E0-8369-F9D2ECE13C34}" type="datetimeFigureOut">
               <a:rPr lang="en-US" smtClean="0"/>
-              <a:t>6/24/2016</a:t>
+              <a:t>3/12/2018</a:t>
             </a:fld>
             <a:endParaRPr lang="en-US"/>
           </a:p>
@@ -557,10 +569,9 @@
           <a:lstStyle/>
           <a:p>
             <a:r>
-              <a:rPr lang="en-US" smtClean="0"/>
+              <a:rPr lang="en-US"/>
               <a:t>Click to edit Master title style</a:t>
             </a:r>
-            <a:endParaRPr lang="en-US"/>
           </a:p>
         </p:txBody>
       </p:sp>
@@ -586,38 +597,37 @@
           <a:p>
             <a:pPr lvl="0"/>
             <a:r>
-              <a:rPr lang="en-US" smtClean="0"/>
+              <a:rPr lang="en-US"/>
               <a:t>Click to edit Master text styles</a:t>
             </a:r>
           </a:p>
           <a:p>
             <a:pPr lvl="1"/>
             <a:r>
-              <a:rPr lang="en-US" smtClean="0"/>
+              <a:rPr lang="en-US"/>
               <a:t>Second level</a:t>
             </a:r>
           </a:p>
           <a:p>
             <a:pPr lvl="2"/>
             <a:r>
-              <a:rPr lang="en-US" smtClean="0"/>
+              <a:rPr lang="en-US"/>
               <a:t>Third level</a:t>
             </a:r>
           </a:p>
           <a:p>
             <a:pPr lvl="3"/>
             <a:r>
-              <a:rPr lang="en-US" smtClean="0"/>
+              <a:rPr lang="en-US"/>
               <a:t>Fourth level</a:t>
             </a:r>
           </a:p>
           <a:p>
             <a:pPr lvl="4"/>
             <a:r>
-              <a:rPr lang="en-US" smtClean="0"/>
+              <a:rPr lang="en-US"/>
               <a:t>Fifth level</a:t>
             </a:r>
-            <a:endParaRPr lang="en-US"/>
           </a:p>
         </p:txBody>
       </p:sp>
@@ -638,7 +648,7 @@
           <a:p>
             <a:fld id="{4752DE93-9BB2-40E0-8369-F9D2ECE13C34}" type="datetimeFigureOut">
               <a:rPr lang="en-US" smtClean="0"/>
-              <a:t>6/24/2016</a:t>
+              <a:t>3/12/2018</a:t>
             </a:fld>
             <a:endParaRPr lang="en-US"/>
           </a:p>
@@ -732,10 +742,9 @@
           <a:lstStyle/>
           <a:p>
             <a:r>
-              <a:rPr lang="en-US" smtClean="0"/>
+              <a:rPr lang="en-US"/>
               <a:t>Click to edit Master title style</a:t>
             </a:r>
-            <a:endParaRPr lang="en-US"/>
           </a:p>
         </p:txBody>
       </p:sp>
@@ -756,38 +765,37 @@
           <a:p>
             <a:pPr lvl="0"/>
             <a:r>
-              <a:rPr lang="en-US" smtClean="0"/>
+              <a:rPr lang="en-US"/>
               <a:t>Click to edit Master text styles</a:t>
             </a:r>
           </a:p>
           <a:p>
             <a:pPr lvl="1"/>
             <a:r>
-              <a:rPr lang="en-US" smtClean="0"/>
+              <a:rPr lang="en-US"/>
               <a:t>Second level</a:t>
             </a:r>
           </a:p>
           <a:p>
             <a:pPr lvl="2"/>
             <a:r>
-              <a:rPr lang="en-US" smtClean="0"/>
+              <a:rPr lang="en-US"/>
               <a:t>Third level</a:t>
             </a:r>
           </a:p>
           <a:p>
             <a:pPr lvl="3"/>
             <a:r>
-              <a:rPr lang="en-US" smtClean="0"/>
+              <a:rPr lang="en-US"/>
               <a:t>Fourth level</a:t>
             </a:r>
           </a:p>
           <a:p>
             <a:pPr lvl="4"/>
             <a:r>
-              <a:rPr lang="en-US" smtClean="0"/>
+              <a:rPr lang="en-US"/>
               <a:t>Fifth level</a:t>
             </a:r>
-            <a:endParaRPr lang="en-US"/>
           </a:p>
         </p:txBody>
       </p:sp>
@@ -808,7 +816,7 @@
           <a:p>
             <a:fld id="{4752DE93-9BB2-40E0-8369-F9D2ECE13C34}" type="datetimeFigureOut">
               <a:rPr lang="en-US" smtClean="0"/>
-              <a:t>6/24/2016</a:t>
+              <a:t>3/12/2018</a:t>
             </a:fld>
             <a:endParaRPr lang="en-US"/>
           </a:p>
@@ -911,10 +919,9 @@
           </a:lstStyle>
           <a:p>
             <a:r>
-              <a:rPr lang="en-US" smtClean="0"/>
+              <a:rPr lang="en-US"/>
               <a:t>Click to edit Master title style</a:t>
             </a:r>
-            <a:endParaRPr lang="en-US"/>
           </a:p>
         </p:txBody>
       </p:sp>
@@ -1031,7 +1038,7 @@
           <a:p>
             <a:pPr lvl="0"/>
             <a:r>
-              <a:rPr lang="en-US" smtClean="0"/>
+              <a:rPr lang="en-US"/>
               <a:t>Click to edit Master text styles</a:t>
             </a:r>
           </a:p>
@@ -1054,7 +1061,7 @@
           <a:p>
             <a:fld id="{4752DE93-9BB2-40E0-8369-F9D2ECE13C34}" type="datetimeFigureOut">
               <a:rPr lang="en-US" smtClean="0"/>
-              <a:t>6/24/2016</a:t>
+              <a:t>3/12/2018</a:t>
             </a:fld>
             <a:endParaRPr lang="en-US"/>
           </a:p>
@@ -1148,10 +1155,9 @@
           <a:lstStyle/>
           <a:p>
             <a:r>
-              <a:rPr lang="en-US" smtClean="0"/>
+              <a:rPr lang="en-US"/>
               <a:t>Click to edit Master title style</a:t>
             </a:r>
-            <a:endParaRPr lang="en-US"/>
           </a:p>
         </p:txBody>
       </p:sp>
@@ -1205,38 +1211,37 @@
           <a:p>
             <a:pPr lvl="0"/>
             <a:r>
-              <a:rPr lang="en-US" smtClean="0"/>
+              <a:rPr lang="en-US"/>
               <a:t>Click to edit Master text styles</a:t>
             </a:r>
           </a:p>
           <a:p>
             <a:pPr lvl="1"/>
             <a:r>
-              <a:rPr lang="en-US" smtClean="0"/>
+              <a:rPr lang="en-US"/>
               <a:t>Second level</a:t>
             </a:r>
           </a:p>
           <a:p>
             <a:pPr lvl="2"/>
             <a:r>
-              <a:rPr lang="en-US" smtClean="0"/>
+              <a:rPr lang="en-US"/>
               <a:t>Third level</a:t>
             </a:r>
           </a:p>
           <a:p>
             <a:pPr lvl="3"/>
             <a:r>
-              <a:rPr lang="en-US" smtClean="0"/>
+              <a:rPr lang="en-US"/>
               <a:t>Fourth level</a:t>
             </a:r>
           </a:p>
           <a:p>
             <a:pPr lvl="4"/>
             <a:r>
-              <a:rPr lang="en-US" smtClean="0"/>
+              <a:rPr lang="en-US"/>
               <a:t>Fifth level</a:t>
             </a:r>
-            <a:endParaRPr lang="en-US"/>
           </a:p>
         </p:txBody>
       </p:sp>
@@ -1290,38 +1295,37 @@
           <a:p>
             <a:pPr lvl="0"/>
             <a:r>
-              <a:rPr lang="en-US" smtClean="0"/>
+              <a:rPr lang="en-US"/>
               <a:t>Click to edit Master text styles</a:t>
             </a:r>
           </a:p>
           <a:p>
             <a:pPr lvl="1"/>
             <a:r>
-              <a:rPr lang="en-US" smtClean="0"/>
+              <a:rPr lang="en-US"/>
               <a:t>Second level</a:t>
             </a:r>
           </a:p>
           <a:p>
             <a:pPr lvl="2"/>
             <a:r>
-              <a:rPr lang="en-US" smtClean="0"/>
+              <a:rPr lang="en-US"/>
               <a:t>Third level</a:t>
             </a:r>
           </a:p>
           <a:p>
             <a:pPr lvl="3"/>
             <a:r>
-              <a:rPr lang="en-US" smtClean="0"/>
+              <a:rPr lang="en-US"/>
               <a:t>Fourth level</a:t>
             </a:r>
           </a:p>
           <a:p>
             <a:pPr lvl="4"/>
             <a:r>
-              <a:rPr lang="en-US" smtClean="0"/>
+              <a:rPr lang="en-US"/>
               <a:t>Fifth level</a:t>
             </a:r>
-            <a:endParaRPr lang="en-US"/>
           </a:p>
         </p:txBody>
       </p:sp>
@@ -1342,7 +1346,7 @@
           <a:p>
             <a:fld id="{4752DE93-9BB2-40E0-8369-F9D2ECE13C34}" type="datetimeFigureOut">
               <a:rPr lang="en-US" smtClean="0"/>
-              <a:t>6/24/2016</a:t>
+              <a:t>3/12/2018</a:t>
             </a:fld>
             <a:endParaRPr lang="en-US"/>
           </a:p>
@@ -1440,10 +1444,9 @@
           </a:lstStyle>
           <a:p>
             <a:r>
-              <a:rPr lang="en-US" smtClean="0"/>
+              <a:rPr lang="en-US"/>
               <a:t>Click to edit Master title style</a:t>
             </a:r>
-            <a:endParaRPr lang="en-US"/>
           </a:p>
         </p:txBody>
       </p:sp>
@@ -1506,7 +1509,7 @@
           <a:p>
             <a:pPr lvl="0"/>
             <a:r>
-              <a:rPr lang="en-US" smtClean="0"/>
+              <a:rPr lang="en-US"/>
               <a:t>Click to edit Master text styles</a:t>
             </a:r>
           </a:p>
@@ -1562,38 +1565,37 @@
           <a:p>
             <a:pPr lvl="0"/>
             <a:r>
-              <a:rPr lang="en-US" smtClean="0"/>
+              <a:rPr lang="en-US"/>
               <a:t>Click to edit Master text styles</a:t>
             </a:r>
           </a:p>
           <a:p>
             <a:pPr lvl="1"/>
             <a:r>
-              <a:rPr lang="en-US" smtClean="0"/>
+              <a:rPr lang="en-US"/>
               <a:t>Second level</a:t>
             </a:r>
           </a:p>
           <a:p>
             <a:pPr lvl="2"/>
             <a:r>
-              <a:rPr lang="en-US" smtClean="0"/>
+              <a:rPr lang="en-US"/>
               <a:t>Third level</a:t>
             </a:r>
           </a:p>
           <a:p>
             <a:pPr lvl="3"/>
             <a:r>
-              <a:rPr lang="en-US" smtClean="0"/>
+              <a:rPr lang="en-US"/>
               <a:t>Fourth level</a:t>
             </a:r>
           </a:p>
           <a:p>
             <a:pPr lvl="4"/>
             <a:r>
-              <a:rPr lang="en-US" smtClean="0"/>
+              <a:rPr lang="en-US"/>
               <a:t>Fifth level</a:t>
             </a:r>
-            <a:endParaRPr lang="en-US"/>
           </a:p>
         </p:txBody>
       </p:sp>
@@ -1656,7 +1658,7 @@
           <a:p>
             <a:pPr lvl="0"/>
             <a:r>
-              <a:rPr lang="en-US" smtClean="0"/>
+              <a:rPr lang="en-US"/>
               <a:t>Click to edit Master text styles</a:t>
             </a:r>
           </a:p>
@@ -1712,38 +1714,37 @@
           <a:p>
             <a:pPr lvl="0"/>
             <a:r>
-              <a:rPr lang="en-US" smtClean="0"/>
+              <a:rPr lang="en-US"/>
               <a:t>Click to edit Master text styles</a:t>
             </a:r>
           </a:p>
           <a:p>
             <a:pPr lvl="1"/>
             <a:r>
-              <a:rPr lang="en-US" smtClean="0"/>
+              <a:rPr lang="en-US"/>
               <a:t>Second level</a:t>
             </a:r>
           </a:p>
           <a:p>
             <a:pPr lvl="2"/>
             <a:r>
-              <a:rPr lang="en-US" smtClean="0"/>
+              <a:rPr lang="en-US"/>
               <a:t>Third level</a:t>
             </a:r>
           </a:p>
           <a:p>
             <a:pPr lvl="3"/>
             <a:r>
-              <a:rPr lang="en-US" smtClean="0"/>
+              <a:rPr lang="en-US"/>
               <a:t>Fourth level</a:t>
             </a:r>
           </a:p>
           <a:p>
             <a:pPr lvl="4"/>
             <a:r>
-              <a:rPr lang="en-US" smtClean="0"/>
+              <a:rPr lang="en-US"/>
               <a:t>Fifth level</a:t>
             </a:r>
-            <a:endParaRPr lang="en-US"/>
           </a:p>
         </p:txBody>
       </p:sp>
@@ -1764,7 +1765,7 @@
           <a:p>
             <a:fld id="{4752DE93-9BB2-40E0-8369-F9D2ECE13C34}" type="datetimeFigureOut">
               <a:rPr lang="en-US" smtClean="0"/>
-              <a:t>6/24/2016</a:t>
+              <a:t>3/12/2018</a:t>
             </a:fld>
             <a:endParaRPr lang="en-US"/>
           </a:p>
@@ -1858,10 +1859,9 @@
           <a:lstStyle/>
           <a:p>
             <a:r>
-              <a:rPr lang="en-US" smtClean="0"/>
+              <a:rPr lang="en-US"/>
               <a:t>Click to edit Master title style</a:t>
             </a:r>
-            <a:endParaRPr lang="en-US"/>
           </a:p>
         </p:txBody>
       </p:sp>
@@ -1882,7 +1882,7 @@
           <a:p>
             <a:fld id="{4752DE93-9BB2-40E0-8369-F9D2ECE13C34}" type="datetimeFigureOut">
               <a:rPr lang="en-US" smtClean="0"/>
-              <a:t>6/24/2016</a:t>
+              <a:t>3/12/2018</a:t>
             </a:fld>
             <a:endParaRPr lang="en-US"/>
           </a:p>
@@ -1977,7 +1977,7 @@
           <a:p>
             <a:fld id="{4752DE93-9BB2-40E0-8369-F9D2ECE13C34}" type="datetimeFigureOut">
               <a:rPr lang="en-US" smtClean="0"/>
-              <a:t>6/24/2016</a:t>
+              <a:t>3/12/2018</a:t>
             </a:fld>
             <a:endParaRPr lang="en-US"/>
           </a:p>
@@ -2080,10 +2080,9 @@
           </a:lstStyle>
           <a:p>
             <a:r>
-              <a:rPr lang="en-US" smtClean="0"/>
+              <a:rPr lang="en-US"/>
               <a:t>Click to edit Master title style</a:t>
             </a:r>
-            <a:endParaRPr lang="en-US"/>
           </a:p>
         </p:txBody>
       </p:sp>
@@ -2137,38 +2136,37 @@
           <a:p>
             <a:pPr lvl="0"/>
             <a:r>
-              <a:rPr lang="en-US" smtClean="0"/>
+              <a:rPr lang="en-US"/>
               <a:t>Click to edit Master text styles</a:t>
             </a:r>
           </a:p>
           <a:p>
             <a:pPr lvl="1"/>
             <a:r>
-              <a:rPr lang="en-US" smtClean="0"/>
+              <a:rPr lang="en-US"/>
               <a:t>Second level</a:t>
             </a:r>
           </a:p>
           <a:p>
             <a:pPr lvl="2"/>
             <a:r>
-              <a:rPr lang="en-US" smtClean="0"/>
+              <a:rPr lang="en-US"/>
               <a:t>Third level</a:t>
             </a:r>
           </a:p>
           <a:p>
             <a:pPr lvl="3"/>
             <a:r>
-              <a:rPr lang="en-US" smtClean="0"/>
+              <a:rPr lang="en-US"/>
               <a:t>Fourth level</a:t>
             </a:r>
           </a:p>
           <a:p>
             <a:pPr lvl="4"/>
             <a:r>
-              <a:rPr lang="en-US" smtClean="0"/>
+              <a:rPr lang="en-US"/>
               <a:t>Fifth level</a:t>
             </a:r>
-            <a:endParaRPr lang="en-US"/>
           </a:p>
         </p:txBody>
       </p:sp>
@@ -2231,7 +2229,7 @@
           <a:p>
             <a:pPr lvl="0"/>
             <a:r>
-              <a:rPr lang="en-US" smtClean="0"/>
+              <a:rPr lang="en-US"/>
               <a:t>Click to edit Master text styles</a:t>
             </a:r>
           </a:p>
@@ -2254,7 +2252,7 @@
           <a:p>
             <a:fld id="{4752DE93-9BB2-40E0-8369-F9D2ECE13C34}" type="datetimeFigureOut">
               <a:rPr lang="en-US" smtClean="0"/>
-              <a:t>6/24/2016</a:t>
+              <a:t>3/12/2018</a:t>
             </a:fld>
             <a:endParaRPr lang="en-US"/>
           </a:p>
@@ -2357,10 +2355,9 @@
           </a:lstStyle>
           <a:p>
             <a:r>
-              <a:rPr lang="en-US" smtClean="0"/>
+              <a:rPr lang="en-US"/>
               <a:t>Click to edit Master title style</a:t>
             </a:r>
-            <a:endParaRPr lang="en-US"/>
           </a:p>
         </p:txBody>
       </p:sp>
@@ -2484,7 +2481,7 @@
           <a:p>
             <a:pPr lvl="0"/>
             <a:r>
-              <a:rPr lang="en-US" smtClean="0"/>
+              <a:rPr lang="en-US"/>
               <a:t>Click to edit Master text styles</a:t>
             </a:r>
           </a:p>
@@ -2507,7 +2504,7 @@
           <a:p>
             <a:fld id="{4752DE93-9BB2-40E0-8369-F9D2ECE13C34}" type="datetimeFigureOut">
               <a:rPr lang="en-US" smtClean="0"/>
-              <a:t>6/24/2016</a:t>
+              <a:t>3/12/2018</a:t>
             </a:fld>
             <a:endParaRPr lang="en-US"/>
           </a:p>
@@ -2616,10 +2613,9 @@
           <a:lstStyle/>
           <a:p>
             <a:r>
-              <a:rPr lang="en-US" smtClean="0"/>
+              <a:rPr lang="en-US"/>
               <a:t>Click to edit Master title style</a:t>
             </a:r>
-            <a:endParaRPr lang="en-US"/>
           </a:p>
         </p:txBody>
       </p:sp>
@@ -2650,38 +2646,37 @@
           <a:p>
             <a:pPr lvl="0"/>
             <a:r>
-              <a:rPr lang="en-US" smtClean="0"/>
+              <a:rPr lang="en-US"/>
               <a:t>Click to edit Master text styles</a:t>
             </a:r>
           </a:p>
           <a:p>
             <a:pPr lvl="1"/>
             <a:r>
-              <a:rPr lang="en-US" smtClean="0"/>
+              <a:rPr lang="en-US"/>
               <a:t>Second level</a:t>
             </a:r>
           </a:p>
           <a:p>
             <a:pPr lvl="2"/>
             <a:r>
-              <a:rPr lang="en-US" smtClean="0"/>
+              <a:rPr lang="en-US"/>
               <a:t>Third level</a:t>
             </a:r>
           </a:p>
           <a:p>
             <a:pPr lvl="3"/>
             <a:r>
-              <a:rPr lang="en-US" smtClean="0"/>
+              <a:rPr lang="en-US"/>
               <a:t>Fourth level</a:t>
             </a:r>
           </a:p>
           <a:p>
             <a:pPr lvl="4"/>
             <a:r>
-              <a:rPr lang="en-US" smtClean="0"/>
+              <a:rPr lang="en-US"/>
               <a:t>Fifth level</a:t>
             </a:r>
-            <a:endParaRPr lang="en-US"/>
           </a:p>
         </p:txBody>
       </p:sp>
@@ -2720,7 +2715,7 @@
           <a:p>
             <a:fld id="{4752DE93-9BB2-40E0-8369-F9D2ECE13C34}" type="datetimeFigureOut">
               <a:rPr lang="en-US" smtClean="0"/>
-              <a:t>6/24/2016</a:t>
+              <a:t>3/12/2018</a:t>
             </a:fld>
             <a:endParaRPr lang="en-US"/>
           </a:p>
@@ -3137,7 +3132,7 @@
           <a:p>
             <a:pPr algn="ctr"/>
             <a:r>
-              <a:rPr lang="en-US" sz="1000" dirty="0" err="1" smtClean="0"/>
+              <a:rPr lang="en-US" sz="1000" dirty="0" err="1"/>
               <a:t>mpx.h</a:t>
             </a:r>
             <a:endParaRPr lang="en-US" sz="1000" dirty="0"/>
@@ -3167,24 +3162,24 @@
           <a:lstStyle/>
           <a:p>
             <a:r>
-              <a:rPr lang="en-US" sz="1000" dirty="0" smtClean="0"/>
+              <a:rPr lang="en-US" sz="1000" dirty="0"/>
               <a:t>MPX_VAR</a:t>
             </a:r>
           </a:p>
           <a:p>
             <a:r>
-              <a:rPr lang="en-US" sz="1000" dirty="0" err="1" smtClean="0"/>
+              <a:rPr lang="en-US" sz="1000" dirty="0" err="1"/>
               <a:t>mpx_t</a:t>
             </a:r>
-            <a:endParaRPr lang="en-US" sz="1000" dirty="0" smtClean="0"/>
-          </a:p>
-          <a:p>
-            <a:r>
-              <a:rPr lang="en-US" sz="1000" dirty="0" err="1" smtClean="0"/>
+            <a:endParaRPr lang="en-US" sz="1000" dirty="0"/>
+          </a:p>
+          <a:p>
+            <a:r>
+              <a:rPr lang="en-US" sz="1000" dirty="0" err="1"/>
               <a:t>mpx</a:t>
             </a:r>
             <a:r>
-              <a:rPr lang="en-US" sz="1000" dirty="0" smtClean="0"/>
+              <a:rPr lang="en-US" sz="1000" dirty="0"/>
               <a:t>_*()</a:t>
             </a:r>
           </a:p>
@@ -3232,7 +3227,7 @@
           <a:p>
             <a:pPr algn="ctr"/>
             <a:r>
-              <a:rPr lang="en-US" sz="1000" dirty="0" err="1" smtClean="0"/>
+              <a:rPr lang="en-US" sz="1000" dirty="0" err="1"/>
               <a:t>uenv.c</a:t>
             </a:r>
             <a:endParaRPr lang="en-US" sz="1000" dirty="0"/>
@@ -3281,7 +3276,7 @@
           <a:p>
             <a:pPr algn="ctr"/>
             <a:r>
-              <a:rPr lang="en-US" sz="1000" dirty="0" err="1" smtClean="0"/>
+              <a:rPr lang="en-US" sz="1000" dirty="0" err="1"/>
               <a:t>uenv.h</a:t>
             </a:r>
             <a:endParaRPr lang="en-US" sz="1000" dirty="0"/>
@@ -3323,25 +3318,21 @@
           </a:p>
           <a:p>
             <a:r>
-              <a:rPr lang="en-US" sz="1000" dirty="0" err="1" smtClean="0"/>
+              <a:rPr lang="en-US" sz="1000" dirty="0" err="1"/>
               <a:t>init_uenv</a:t>
             </a:r>
             <a:r>
-              <a:rPr lang="en-US" sz="1000" dirty="0" smtClean="0"/>
-              <a:t>()</a:t>
-            </a:r>
-          </a:p>
-          <a:p>
-            <a:r>
-              <a:rPr lang="en-US" sz="1000" dirty="0" err="1"/>
-              <a:t>s</a:t>
-            </a:r>
-            <a:r>
-              <a:rPr lang="en-US" sz="1000" dirty="0" err="1" smtClean="0"/>
-              <a:t>et_uenv</a:t>
-            </a:r>
-            <a:r>
-              <a:rPr lang="en-US" sz="1000" dirty="0" smtClean="0"/>
+              <a:rPr lang="en-US" sz="1000" dirty="0"/>
+              <a:t>()</a:t>
+            </a:r>
+          </a:p>
+          <a:p>
+            <a:r>
+              <a:rPr lang="en-US" sz="1000" dirty="0" err="1"/>
+              <a:t>set_uenv</a:t>
+            </a:r>
+            <a:r>
+              <a:rPr lang="en-US" sz="1000" dirty="0"/>
               <a:t>()</a:t>
             </a:r>
           </a:p>
@@ -3389,7 +3380,7 @@
           <a:p>
             <a:pPr algn="ctr"/>
             <a:r>
-              <a:rPr lang="en-US" sz="1000" dirty="0" err="1" smtClean="0"/>
+              <a:rPr lang="en-US" sz="1000" dirty="0" err="1"/>
               <a:t>ubnd.h</a:t>
             </a:r>
             <a:endParaRPr lang="en-US" sz="1000" dirty="0"/>
@@ -3419,67 +3410,67 @@
           <a:lstStyle/>
           <a:p>
             <a:r>
-              <a:rPr lang="en-US" sz="1000" dirty="0" err="1" smtClean="0"/>
+              <a:rPr lang="en-US" sz="1000" dirty="0" err="1"/>
               <a:t>ltuQ</a:t>
             </a:r>
             <a:r>
-              <a:rPr lang="en-US" sz="1000" dirty="0" smtClean="0"/>
-              <a:t>()</a:t>
-            </a:r>
-          </a:p>
-          <a:p>
-            <a:r>
-              <a:rPr lang="en-US" sz="1000" dirty="0" err="1" smtClean="0"/>
+              <a:rPr lang="en-US" sz="1000" dirty="0"/>
+              <a:t>()</a:t>
+            </a:r>
+          </a:p>
+          <a:p>
+            <a:r>
+              <a:rPr lang="en-US" sz="1000" dirty="0" err="1"/>
               <a:t>gtuQ</a:t>
             </a:r>
             <a:r>
-              <a:rPr lang="en-US" sz="1000" dirty="0" smtClean="0"/>
-              <a:t>()</a:t>
-            </a:r>
-          </a:p>
-          <a:p>
-            <a:r>
-              <a:rPr lang="en-US" sz="1000" dirty="0" err="1" smtClean="0"/>
+              <a:rPr lang="en-US" sz="1000" dirty="0"/>
+              <a:t>()</a:t>
+            </a:r>
+          </a:p>
+          <a:p>
+            <a:r>
+              <a:rPr lang="en-US" sz="1000" dirty="0" err="1"/>
               <a:t>nequQ</a:t>
             </a:r>
             <a:r>
-              <a:rPr lang="en-US" sz="1000" dirty="0" smtClean="0"/>
-              <a:t>()</a:t>
-            </a:r>
-          </a:p>
-          <a:p>
-            <a:r>
-              <a:rPr lang="en-US" sz="1000" dirty="0" err="1" smtClean="0"/>
+              <a:rPr lang="en-US" sz="1000" dirty="0"/>
+              <a:t>()</a:t>
+            </a:r>
+          </a:p>
+          <a:p>
+            <a:r>
+              <a:rPr lang="en-US" sz="1000" dirty="0" err="1"/>
               <a:t>nnequQ</a:t>
             </a:r>
             <a:r>
-              <a:rPr lang="en-US" sz="1000" dirty="0" smtClean="0"/>
-              <a:t>()</a:t>
-            </a:r>
-          </a:p>
-          <a:p>
-            <a:r>
-              <a:rPr lang="en-US" sz="1000" dirty="0" err="1" smtClean="0"/>
+              <a:rPr lang="en-US" sz="1000" dirty="0"/>
+              <a:t>()</a:t>
+            </a:r>
+          </a:p>
+          <a:p>
+            <a:r>
+              <a:rPr lang="en-US" sz="1000" dirty="0" err="1"/>
               <a:t>sameuQ</a:t>
             </a:r>
             <a:r>
-              <a:rPr lang="en-US" sz="1000" dirty="0" smtClean="0"/>
-              <a:t>()</a:t>
-            </a:r>
-          </a:p>
-          <a:p>
-            <a:r>
-              <a:rPr lang="en-US" sz="1000" dirty="0" err="1" smtClean="0"/>
+              <a:rPr lang="en-US" sz="1000" dirty="0"/>
+              <a:t>()</a:t>
+            </a:r>
+          </a:p>
+          <a:p>
+            <a:r>
+              <a:rPr lang="en-US" sz="1000" dirty="0" err="1"/>
               <a:t>spanszerouQ</a:t>
             </a:r>
             <a:r>
-              <a:rPr lang="en-US" sz="1000" dirty="0" smtClean="0"/>
-              <a:t>()</a:t>
-            </a:r>
-          </a:p>
-          <a:p>
-            <a:r>
-              <a:rPr lang="en-US" sz="1000" dirty="0" err="1" smtClean="0">
+              <a:rPr lang="en-US" sz="1000" dirty="0"/>
+              <a:t>()</a:t>
+            </a:r>
+          </a:p>
+          <a:p>
+            <a:r>
+              <a:rPr lang="en-US" sz="1000" dirty="0" err="1">
                 <a:solidFill>
                   <a:srgbClr val="FF0000"/>
                 </a:solidFill>
@@ -3487,7 +3478,7 @@
               <a:t>intersectuQ</a:t>
             </a:r>
             <a:r>
-              <a:rPr lang="en-US" sz="1000" dirty="0" smtClean="0">
+              <a:rPr lang="en-US" sz="1000" dirty="0">
                 <a:solidFill>
                   <a:srgbClr val="FF0000"/>
                 </a:solidFill>
@@ -3497,47 +3488,47 @@
           </a:p>
           <a:p>
             <a:r>
-              <a:rPr lang="en-US" sz="1000" dirty="0" err="1" smtClean="0"/>
+              <a:rPr lang="en-US" sz="1000" dirty="0" err="1"/>
               <a:t>plusu</a:t>
             </a:r>
             <a:r>
-              <a:rPr lang="en-US" sz="1000" dirty="0" smtClean="0"/>
-              <a:t>()</a:t>
-            </a:r>
-          </a:p>
-          <a:p>
-            <a:r>
-              <a:rPr lang="en-US" sz="1000" dirty="0" err="1" smtClean="0"/>
+              <a:rPr lang="en-US" sz="1000" dirty="0"/>
+              <a:t>()</a:t>
+            </a:r>
+          </a:p>
+          <a:p>
+            <a:r>
+              <a:rPr lang="en-US" sz="1000" dirty="0" err="1"/>
               <a:t>minusu</a:t>
             </a:r>
             <a:r>
-              <a:rPr lang="en-US" sz="1000" dirty="0" smtClean="0"/>
-              <a:t>()</a:t>
-            </a:r>
-          </a:p>
-          <a:p>
-            <a:r>
-              <a:rPr lang="en-US" sz="1000" dirty="0" err="1" smtClean="0"/>
+              <a:rPr lang="en-US" sz="1000" dirty="0"/>
+              <a:t>()</a:t>
+            </a:r>
+          </a:p>
+          <a:p>
+            <a:r>
+              <a:rPr lang="en-US" sz="1000" dirty="0" err="1"/>
               <a:t>timesu</a:t>
             </a:r>
             <a:r>
-              <a:rPr lang="en-US" sz="1000" dirty="0" smtClean="0"/>
-              <a:t>()</a:t>
-            </a:r>
-          </a:p>
-          <a:p>
-            <a:r>
-              <a:rPr lang="en-US" sz="1000" dirty="0" err="1" smtClean="0"/>
+              <a:rPr lang="en-US" sz="1000" dirty="0"/>
+              <a:t>()</a:t>
+            </a:r>
+          </a:p>
+          <a:p>
+            <a:r>
+              <a:rPr lang="en-US" sz="1000" dirty="0" err="1"/>
               <a:t>divideu</a:t>
             </a:r>
             <a:r>
-              <a:rPr lang="en-US" sz="1000" dirty="0" smtClean="0"/>
-              <a:t>()</a:t>
-            </a:r>
-          </a:p>
-          <a:p>
-            <a:r>
-              <a:rPr lang="en-US" sz="1000" dirty="0" err="1" smtClean="0">
+              <a:rPr lang="en-US" sz="1000" dirty="0"/>
+              <a:t>()</a:t>
+            </a:r>
+          </a:p>
+          <a:p>
+            <a:r>
+              <a:rPr lang="en-US" sz="1000" dirty="0" err="1">
                 <a:solidFill>
                   <a:srgbClr val="FF0000"/>
                 </a:solidFill>
@@ -3545,7 +3536,7 @@
               <a:t>powu</a:t>
             </a:r>
             <a:r>
-              <a:rPr lang="en-US" sz="1000" dirty="0" smtClean="0">
+              <a:rPr lang="en-US" sz="1000" dirty="0">
                 <a:solidFill>
                   <a:srgbClr val="FF0000"/>
                 </a:solidFill>
@@ -3575,27 +3566,27 @@
           </a:p>
           <a:p>
             <a:r>
-              <a:rPr lang="en-US" sz="1000" dirty="0" err="1" smtClean="0"/>
+              <a:rPr lang="en-US" sz="1000" dirty="0" err="1"/>
               <a:t>negateu</a:t>
             </a:r>
             <a:r>
-              <a:rPr lang="en-US" sz="1000" dirty="0" smtClean="0"/>
-              <a:t>()</a:t>
-            </a:r>
-          </a:p>
-          <a:p>
-            <a:r>
-              <a:rPr lang="en-US" sz="1000" dirty="0" err="1" smtClean="0"/>
+              <a:rPr lang="en-US" sz="1000" dirty="0"/>
+              <a:t>()</a:t>
+            </a:r>
+          </a:p>
+          <a:p>
+            <a:r>
+              <a:rPr lang="en-US" sz="1000" dirty="0" err="1"/>
               <a:t>absu</a:t>
             </a:r>
             <a:r>
-              <a:rPr lang="en-US" sz="1000" dirty="0" smtClean="0"/>
-              <a:t>()</a:t>
-            </a:r>
-          </a:p>
-          <a:p>
-            <a:r>
-              <a:rPr lang="en-US" sz="1000" dirty="0" err="1" smtClean="0">
+              <a:rPr lang="en-US" sz="1000" dirty="0"/>
+              <a:t>()</a:t>
+            </a:r>
+          </a:p>
+          <a:p>
+            <a:r>
+              <a:rPr lang="en-US" sz="1000" dirty="0" err="1">
                 <a:solidFill>
                   <a:srgbClr val="FF0000"/>
                 </a:solidFill>
@@ -3603,7 +3594,7 @@
               <a:t>expu</a:t>
             </a:r>
             <a:r>
-              <a:rPr lang="en-US" sz="1000" dirty="0" smtClean="0">
+              <a:rPr lang="en-US" sz="1000" dirty="0">
                 <a:solidFill>
                   <a:srgbClr val="FF0000"/>
                 </a:solidFill>
@@ -3613,7 +3604,7 @@
           </a:p>
           <a:p>
             <a:r>
-              <a:rPr lang="en-US" sz="1000" dirty="0" err="1" smtClean="0">
+              <a:rPr lang="en-US" sz="1000" dirty="0" err="1">
                 <a:solidFill>
                   <a:srgbClr val="FF0000"/>
                 </a:solidFill>
@@ -3621,7 +3612,7 @@
               <a:t>logu</a:t>
             </a:r>
             <a:r>
-              <a:rPr lang="en-US" sz="1000" dirty="0" smtClean="0">
+              <a:rPr lang="en-US" sz="1000" dirty="0">
                 <a:solidFill>
                   <a:srgbClr val="FF0000"/>
                 </a:solidFill>
@@ -3631,7 +3622,7 @@
           </a:p>
           <a:p>
             <a:r>
-              <a:rPr lang="en-US" sz="1000" dirty="0" err="1" smtClean="0">
+              <a:rPr lang="en-US" sz="1000" dirty="0" err="1">
                 <a:solidFill>
                   <a:srgbClr val="FF0000"/>
                 </a:solidFill>
@@ -3639,7 +3630,7 @@
               <a:t>cosu</a:t>
             </a:r>
             <a:r>
-              <a:rPr lang="en-US" sz="1000" dirty="0" smtClean="0">
+              <a:rPr lang="en-US" sz="1000" dirty="0">
                 <a:solidFill>
                   <a:srgbClr val="FF0000"/>
                 </a:solidFill>
@@ -3649,7 +3640,7 @@
           </a:p>
           <a:p>
             <a:r>
-              <a:rPr lang="en-US" sz="1000" dirty="0" err="1" smtClean="0">
+              <a:rPr lang="en-US" sz="1000" dirty="0" err="1">
                 <a:solidFill>
                   <a:srgbClr val="FF0000"/>
                 </a:solidFill>
@@ -3657,7 +3648,7 @@
               <a:t>sinu</a:t>
             </a:r>
             <a:r>
-              <a:rPr lang="en-US" sz="1000" dirty="0" smtClean="0">
+              <a:rPr lang="en-US" sz="1000" dirty="0">
                 <a:solidFill>
                   <a:srgbClr val="FF0000"/>
                 </a:solidFill>
@@ -3667,7 +3658,7 @@
           </a:p>
           <a:p>
             <a:r>
-              <a:rPr lang="en-US" sz="1000" dirty="0" err="1" smtClean="0">
+              <a:rPr lang="en-US" sz="1000" dirty="0" err="1">
                 <a:solidFill>
                   <a:srgbClr val="FF0000"/>
                 </a:solidFill>
@@ -3675,7 +3666,7 @@
               <a:t>tanu</a:t>
             </a:r>
             <a:r>
-              <a:rPr lang="en-US" sz="1000" dirty="0" smtClean="0">
+              <a:rPr lang="en-US" sz="1000" dirty="0">
                 <a:solidFill>
                   <a:srgbClr val="FF0000"/>
                 </a:solidFill>
@@ -3685,7 +3676,7 @@
           </a:p>
           <a:p>
             <a:r>
-              <a:rPr lang="en-US" sz="1000" dirty="0" err="1" smtClean="0">
+              <a:rPr lang="en-US" sz="1000" dirty="0" err="1">
                 <a:solidFill>
                   <a:srgbClr val="FF0000"/>
                 </a:solidFill>
@@ -3693,7 +3684,7 @@
               <a:t>cotu</a:t>
             </a:r>
             <a:r>
-              <a:rPr lang="en-US" sz="1000" dirty="0" smtClean="0">
+              <a:rPr lang="en-US" sz="1000" dirty="0">
                 <a:solidFill>
                   <a:srgbClr val="FF0000"/>
                 </a:solidFill>
@@ -3745,7 +3736,7 @@
           <a:p>
             <a:pPr algn="ctr"/>
             <a:r>
-              <a:rPr lang="en-US" sz="1000" dirty="0" err="1" smtClean="0"/>
+              <a:rPr lang="en-US" sz="1000" dirty="0" err="1"/>
               <a:t>ubnd.c</a:t>
             </a:r>
             <a:endParaRPr lang="en-US" sz="1000" dirty="0"/>
@@ -3794,7 +3785,7 @@
           <a:p>
             <a:pPr algn="ctr"/>
             <a:r>
-              <a:rPr lang="en-US" sz="1000" dirty="0" err="1" smtClean="0"/>
+              <a:rPr lang="en-US" sz="1000" dirty="0" err="1"/>
               <a:t>ulayer.h</a:t>
             </a:r>
             <a:endParaRPr lang="en-US" sz="1000" dirty="0"/>
@@ -3825,66 +3816,56 @@
           <a:p>
             <a:r>
               <a:rPr lang="en-US" sz="1000" dirty="0" err="1"/>
-              <a:t>u</a:t>
-            </a:r>
-            <a:r>
-              <a:rPr lang="en-US" sz="1000" dirty="0" err="1" smtClean="0"/>
-              <a:t>num_t</a:t>
-            </a:r>
-            <a:endParaRPr lang="en-US" sz="1000" dirty="0" smtClean="0"/>
-          </a:p>
-          <a:p>
-            <a:r>
-              <a:rPr lang="en-US" sz="1000" dirty="0" err="1" smtClean="0"/>
+              <a:t>unum_t</a:t>
+            </a:r>
+            <a:endParaRPr lang="en-US" sz="1000" dirty="0"/>
+          </a:p>
+          <a:p>
+            <a:r>
+              <a:rPr lang="en-US" sz="1000" dirty="0" err="1"/>
               <a:t>ubnd_t</a:t>
             </a:r>
             <a:endParaRPr lang="en-US" sz="1000" dirty="0"/>
           </a:p>
           <a:p>
             <a:r>
-              <a:rPr lang="en-US" sz="1000" dirty="0" err="1" smtClean="0"/>
+              <a:rPr lang="en-US" sz="1000" dirty="0" err="1"/>
               <a:t>unum_init</a:t>
             </a:r>
             <a:r>
-              <a:rPr lang="en-US" sz="1000" dirty="0" smtClean="0"/>
-              <a:t>()</a:t>
-            </a:r>
-          </a:p>
-          <a:p>
-            <a:r>
-              <a:rPr lang="en-US" sz="1000" dirty="0" err="1"/>
-              <a:t>u</a:t>
-            </a:r>
-            <a:r>
-              <a:rPr lang="en-US" sz="1000" dirty="0" err="1" smtClean="0"/>
-              <a:t>bnd_init</a:t>
-            </a:r>
-            <a:r>
-              <a:rPr lang="en-US" sz="1000" dirty="0" smtClean="0"/>
-              <a:t>()</a:t>
-            </a:r>
-          </a:p>
-          <a:p>
-            <a:r>
-              <a:rPr lang="en-US" sz="1000" dirty="0" err="1" smtClean="0"/>
+              <a:rPr lang="en-US" sz="1000" dirty="0"/>
+              <a:t>()</a:t>
+            </a:r>
+          </a:p>
+          <a:p>
+            <a:r>
+              <a:rPr lang="en-US" sz="1000" dirty="0" err="1"/>
+              <a:t>ubnd_init</a:t>
+            </a:r>
+            <a:r>
+              <a:rPr lang="en-US" sz="1000" dirty="0"/>
+              <a:t>()</a:t>
+            </a:r>
+          </a:p>
+          <a:p>
+            <a:r>
+              <a:rPr lang="en-US" sz="1000" dirty="0" err="1"/>
               <a:t>unum_clear</a:t>
             </a:r>
             <a:r>
-              <a:rPr lang="en-US" sz="1000" dirty="0" smtClean="0"/>
-              <a:t>()</a:t>
-            </a:r>
-            <a:endParaRPr lang="en-US" sz="1000" dirty="0"/>
-          </a:p>
-          <a:p>
-            <a:r>
-              <a:rPr lang="en-US" sz="1000" dirty="0" err="1" smtClean="0"/>
+              <a:rPr lang="en-US" sz="1000" dirty="0"/>
+              <a:t>()</a:t>
+            </a:r>
+          </a:p>
+          <a:p>
+            <a:r>
+              <a:rPr lang="en-US" sz="1000" dirty="0" err="1"/>
               <a:t>ubnd_clear</a:t>
             </a:r>
             <a:r>
-              <a:rPr lang="en-US" sz="1000" dirty="0" smtClean="0"/>
-              <a:t>()</a:t>
-            </a:r>
-            <a:endParaRPr lang="en-US" sz="1000" dirty="0"/>
+              <a:rPr lang="en-US" sz="1000" dirty="0"/>
+              <a:t>()</a:t>
+            </a:r>
           </a:p>
         </p:txBody>
       </p:sp>
@@ -3930,7 +3911,7 @@
           <a:p>
             <a:pPr algn="ctr"/>
             <a:r>
-              <a:rPr lang="en-US" sz="1000" dirty="0" err="1" smtClean="0"/>
+              <a:rPr lang="en-US" sz="1000" dirty="0" err="1"/>
               <a:t>glayer.h</a:t>
             </a:r>
             <a:endParaRPr lang="en-US" sz="1000" dirty="0"/>
@@ -3960,58 +3941,57 @@
           <a:lstStyle/>
           <a:p>
             <a:r>
-              <a:rPr lang="en-US" sz="1000" dirty="0" err="1" smtClean="0"/>
+              <a:rPr lang="en-US" sz="1000" dirty="0" err="1"/>
               <a:t>gnum_t</a:t>
             </a:r>
-            <a:endParaRPr lang="en-US" sz="1000" dirty="0" smtClean="0"/>
-          </a:p>
-          <a:p>
-            <a:r>
-              <a:rPr lang="en-US" sz="1000" dirty="0" err="1" smtClean="0"/>
+            <a:endParaRPr lang="en-US" sz="1000" dirty="0"/>
+          </a:p>
+          <a:p>
+            <a:r>
+              <a:rPr lang="en-US" sz="1000" dirty="0" err="1"/>
               <a:t>gbnd_t</a:t>
             </a:r>
-            <a:endParaRPr lang="en-US" sz="1000" dirty="0" smtClean="0"/>
-          </a:p>
-          <a:p>
-            <a:r>
-              <a:rPr lang="en-US" sz="1000" dirty="0" err="1" smtClean="0"/>
+            <a:endParaRPr lang="en-US" sz="1000" dirty="0"/>
+          </a:p>
+          <a:p>
+            <a:r>
+              <a:rPr lang="en-US" sz="1000" dirty="0" err="1"/>
               <a:t>gnum_init</a:t>
             </a:r>
             <a:r>
-              <a:rPr lang="en-US" sz="1000" dirty="0" smtClean="0"/>
-              <a:t>()</a:t>
-            </a:r>
-          </a:p>
-          <a:p>
-            <a:r>
-              <a:rPr lang="en-US" sz="1000" dirty="0" err="1" smtClean="0"/>
+              <a:rPr lang="en-US" sz="1000" dirty="0"/>
+              <a:t>()</a:t>
+            </a:r>
+          </a:p>
+          <a:p>
+            <a:r>
+              <a:rPr lang="en-US" sz="1000" dirty="0" err="1"/>
               <a:t>gbnd_init</a:t>
             </a:r>
             <a:r>
-              <a:rPr lang="en-US" sz="1000" dirty="0" smtClean="0"/>
-              <a:t>()</a:t>
-            </a:r>
-          </a:p>
-          <a:p>
-            <a:r>
-              <a:rPr lang="en-US" sz="1000" dirty="0" err="1" smtClean="0"/>
+              <a:rPr lang="en-US" sz="1000" dirty="0"/>
+              <a:t>()</a:t>
+            </a:r>
+          </a:p>
+          <a:p>
+            <a:r>
+              <a:rPr lang="en-US" sz="1000" dirty="0" err="1"/>
               <a:t>gnum_clear</a:t>
             </a:r>
             <a:r>
-              <a:rPr lang="en-US" sz="1000" dirty="0" smtClean="0"/>
-              <a:t>()</a:t>
-            </a:r>
-          </a:p>
-          <a:p>
-            <a:r>
-              <a:rPr lang="en-US" sz="1000" dirty="0" err="1" smtClean="0"/>
+              <a:rPr lang="en-US" sz="1000" dirty="0"/>
+              <a:t>()</a:t>
+            </a:r>
+          </a:p>
+          <a:p>
+            <a:r>
+              <a:rPr lang="en-US" sz="1000" dirty="0" err="1"/>
               <a:t>gbnd_clear</a:t>
             </a:r>
             <a:r>
-              <a:rPr lang="en-US" sz="1000" dirty="0" smtClean="0"/>
-              <a:t>()</a:t>
-            </a:r>
-            <a:endParaRPr lang="en-US" sz="1000" dirty="0"/>
+              <a:rPr lang="en-US" sz="1000" dirty="0"/>
+              <a:t>()</a:t>
+            </a:r>
           </a:p>
         </p:txBody>
       </p:sp>
@@ -4057,7 +4037,7 @@
           <a:p>
             <a:pPr algn="ctr"/>
             <a:r>
-              <a:rPr lang="en-US" sz="1000" dirty="0" err="1" smtClean="0"/>
+              <a:rPr lang="en-US" sz="1000" dirty="0" err="1"/>
               <a:t>gbnd.h</a:t>
             </a:r>
             <a:endParaRPr lang="en-US" sz="1000" dirty="0"/>
@@ -4087,67 +4067,67 @@
           <a:lstStyle/>
           <a:p>
             <a:r>
-              <a:rPr lang="en-US" sz="1000" dirty="0" err="1" smtClean="0"/>
+              <a:rPr lang="en-US" sz="1000" dirty="0" err="1"/>
               <a:t>ltgQ</a:t>
             </a:r>
             <a:r>
-              <a:rPr lang="en-US" sz="1000" dirty="0" smtClean="0"/>
-              <a:t>()</a:t>
-            </a:r>
-          </a:p>
-          <a:p>
-            <a:r>
-              <a:rPr lang="en-US" sz="1000" dirty="0" err="1" smtClean="0"/>
+              <a:rPr lang="en-US" sz="1000" dirty="0"/>
+              <a:t>()</a:t>
+            </a:r>
+          </a:p>
+          <a:p>
+            <a:r>
+              <a:rPr lang="en-US" sz="1000" dirty="0" err="1"/>
               <a:t>gtgQ</a:t>
             </a:r>
             <a:r>
-              <a:rPr lang="en-US" sz="1000" dirty="0" smtClean="0"/>
-              <a:t>()</a:t>
-            </a:r>
-          </a:p>
-          <a:p>
-            <a:r>
-              <a:rPr lang="en-US" sz="1000" dirty="0" err="1" smtClean="0"/>
+              <a:rPr lang="en-US" sz="1000" dirty="0"/>
+              <a:t>()</a:t>
+            </a:r>
+          </a:p>
+          <a:p>
+            <a:r>
+              <a:rPr lang="en-US" sz="1000" dirty="0" err="1"/>
               <a:t>neqgQ</a:t>
             </a:r>
             <a:r>
-              <a:rPr lang="en-US" sz="1000" dirty="0" smtClean="0"/>
-              <a:t>()</a:t>
-            </a:r>
-          </a:p>
-          <a:p>
-            <a:r>
-              <a:rPr lang="en-US" sz="1000" dirty="0" err="1" smtClean="0"/>
+              <a:rPr lang="en-US" sz="1000" dirty="0"/>
+              <a:t>()</a:t>
+            </a:r>
+          </a:p>
+          <a:p>
+            <a:r>
+              <a:rPr lang="en-US" sz="1000" dirty="0" err="1"/>
               <a:t>nneqgQ</a:t>
             </a:r>
             <a:r>
-              <a:rPr lang="en-US" sz="1000" dirty="0" smtClean="0"/>
-              <a:t>()</a:t>
-            </a:r>
-          </a:p>
-          <a:p>
-            <a:r>
-              <a:rPr lang="en-US" sz="1000" dirty="0" err="1" smtClean="0"/>
+              <a:rPr lang="en-US" sz="1000" dirty="0"/>
+              <a:t>()</a:t>
+            </a:r>
+          </a:p>
+          <a:p>
+            <a:r>
+              <a:rPr lang="en-US" sz="1000" dirty="0" err="1"/>
               <a:t>samegQ</a:t>
             </a:r>
             <a:r>
-              <a:rPr lang="en-US" sz="1000" dirty="0" smtClean="0"/>
-              <a:t>()</a:t>
-            </a:r>
-          </a:p>
-          <a:p>
-            <a:r>
-              <a:rPr lang="en-US" sz="1000" dirty="0" err="1" smtClean="0"/>
+              <a:rPr lang="en-US" sz="1000" dirty="0"/>
+              <a:t>()</a:t>
+            </a:r>
+          </a:p>
+          <a:p>
+            <a:r>
+              <a:rPr lang="en-US" sz="1000" dirty="0" err="1"/>
               <a:t>spanszerogQ</a:t>
             </a:r>
             <a:r>
-              <a:rPr lang="en-US" sz="1000" dirty="0" smtClean="0"/>
-              <a:t>()</a:t>
-            </a:r>
-          </a:p>
-          <a:p>
-            <a:r>
-              <a:rPr lang="en-US" sz="1000" dirty="0" err="1" smtClean="0">
+              <a:rPr lang="en-US" sz="1000" dirty="0"/>
+              <a:t>()</a:t>
+            </a:r>
+          </a:p>
+          <a:p>
+            <a:r>
+              <a:rPr lang="en-US" sz="1000" dirty="0" err="1">
                 <a:solidFill>
                   <a:srgbClr val="FF0000"/>
                 </a:solidFill>
@@ -4155,7 +4135,7 @@
               <a:t>intersectgQ</a:t>
             </a:r>
             <a:r>
-              <a:rPr lang="en-US" sz="1000" dirty="0" smtClean="0">
+              <a:rPr lang="en-US" sz="1000" dirty="0">
                 <a:solidFill>
                   <a:srgbClr val="FF0000"/>
                 </a:solidFill>
@@ -4165,47 +4145,47 @@
           </a:p>
           <a:p>
             <a:r>
-              <a:rPr lang="en-US" sz="1000" dirty="0" err="1" smtClean="0"/>
+              <a:rPr lang="en-US" sz="1000" dirty="0" err="1"/>
               <a:t>plusg</a:t>
             </a:r>
             <a:r>
-              <a:rPr lang="en-US" sz="1000" dirty="0" smtClean="0"/>
-              <a:t>()</a:t>
-            </a:r>
-          </a:p>
-          <a:p>
-            <a:r>
-              <a:rPr lang="en-US" sz="1000" dirty="0" err="1" smtClean="0"/>
+              <a:rPr lang="en-US" sz="1000" dirty="0"/>
+              <a:t>()</a:t>
+            </a:r>
+          </a:p>
+          <a:p>
+            <a:r>
+              <a:rPr lang="en-US" sz="1000" dirty="0" err="1"/>
               <a:t>minusg</a:t>
             </a:r>
             <a:r>
-              <a:rPr lang="en-US" sz="1000" dirty="0" smtClean="0"/>
-              <a:t>()</a:t>
-            </a:r>
-          </a:p>
-          <a:p>
-            <a:r>
-              <a:rPr lang="en-US" sz="1000" dirty="0" err="1" smtClean="0"/>
+              <a:rPr lang="en-US" sz="1000" dirty="0"/>
+              <a:t>()</a:t>
+            </a:r>
+          </a:p>
+          <a:p>
+            <a:r>
+              <a:rPr lang="en-US" sz="1000" dirty="0" err="1"/>
               <a:t>timesg</a:t>
             </a:r>
             <a:r>
-              <a:rPr lang="en-US" sz="1000" dirty="0" smtClean="0"/>
-              <a:t>()</a:t>
-            </a:r>
-          </a:p>
-          <a:p>
-            <a:r>
-              <a:rPr lang="en-US" sz="1000" dirty="0" err="1" smtClean="0"/>
+              <a:rPr lang="en-US" sz="1000" dirty="0"/>
+              <a:t>()</a:t>
+            </a:r>
+          </a:p>
+          <a:p>
+            <a:r>
+              <a:rPr lang="en-US" sz="1000" dirty="0" err="1"/>
               <a:t>divideg</a:t>
             </a:r>
             <a:r>
-              <a:rPr lang="en-US" sz="1000" dirty="0" smtClean="0"/>
-              <a:t>()</a:t>
-            </a:r>
-          </a:p>
-          <a:p>
-            <a:r>
-              <a:rPr lang="en-US" sz="1000" dirty="0" err="1" smtClean="0">
+              <a:rPr lang="en-US" sz="1000" dirty="0"/>
+              <a:t>()</a:t>
+            </a:r>
+          </a:p>
+          <a:p>
+            <a:r>
+              <a:rPr lang="en-US" sz="1000" dirty="0" err="1">
                 <a:solidFill>
                   <a:srgbClr val="FF0000"/>
                 </a:solidFill>
@@ -4213,7 +4193,7 @@
               <a:t>powg</a:t>
             </a:r>
             <a:r>
-              <a:rPr lang="en-US" sz="1000" dirty="0" smtClean="0">
+              <a:rPr lang="en-US" sz="1000" dirty="0">
                 <a:solidFill>
                   <a:srgbClr val="FF0000"/>
                 </a:solidFill>
@@ -4243,27 +4223,27 @@
           </a:p>
           <a:p>
             <a:r>
-              <a:rPr lang="en-US" sz="1000" dirty="0" err="1" smtClean="0"/>
+              <a:rPr lang="en-US" sz="1000" dirty="0" err="1"/>
               <a:t>negateg</a:t>
             </a:r>
             <a:r>
-              <a:rPr lang="en-US" sz="1000" dirty="0" smtClean="0"/>
-              <a:t>()</a:t>
-            </a:r>
-          </a:p>
-          <a:p>
-            <a:r>
-              <a:rPr lang="en-US" sz="1000" dirty="0" err="1" smtClean="0"/>
+              <a:rPr lang="en-US" sz="1000" dirty="0"/>
+              <a:t>()</a:t>
+            </a:r>
+          </a:p>
+          <a:p>
+            <a:r>
+              <a:rPr lang="en-US" sz="1000" dirty="0" err="1"/>
               <a:t>absg</a:t>
             </a:r>
             <a:r>
-              <a:rPr lang="en-US" sz="1000" dirty="0" smtClean="0"/>
-              <a:t>()</a:t>
-            </a:r>
-          </a:p>
-          <a:p>
-            <a:r>
-              <a:rPr lang="en-US" sz="1000" dirty="0" err="1" smtClean="0">
+              <a:rPr lang="en-US" sz="1000" dirty="0"/>
+              <a:t>()</a:t>
+            </a:r>
+          </a:p>
+          <a:p>
+            <a:r>
+              <a:rPr lang="en-US" sz="1000" dirty="0" err="1">
                 <a:solidFill>
                   <a:srgbClr val="FF0000"/>
                 </a:solidFill>
@@ -4271,7 +4251,7 @@
               <a:t>expg</a:t>
             </a:r>
             <a:r>
-              <a:rPr lang="en-US" sz="1000" dirty="0" smtClean="0">
+              <a:rPr lang="en-US" sz="1000" dirty="0">
                 <a:solidFill>
                   <a:srgbClr val="FF0000"/>
                 </a:solidFill>
@@ -4281,7 +4261,7 @@
           </a:p>
           <a:p>
             <a:r>
-              <a:rPr lang="en-US" sz="1000" dirty="0" err="1" smtClean="0">
+              <a:rPr lang="en-US" sz="1000" dirty="0" err="1">
                 <a:solidFill>
                   <a:srgbClr val="FF0000"/>
                 </a:solidFill>
@@ -4289,7 +4269,7 @@
               <a:t>logg</a:t>
             </a:r>
             <a:r>
-              <a:rPr lang="en-US" sz="1000" dirty="0" smtClean="0">
+              <a:rPr lang="en-US" sz="1000" dirty="0">
                 <a:solidFill>
                   <a:srgbClr val="FF0000"/>
                 </a:solidFill>
@@ -4299,7 +4279,7 @@
           </a:p>
           <a:p>
             <a:r>
-              <a:rPr lang="en-US" sz="1000" dirty="0" err="1" smtClean="0">
+              <a:rPr lang="en-US" sz="1000" dirty="0" err="1">
                 <a:solidFill>
                   <a:srgbClr val="FF0000"/>
                 </a:solidFill>
@@ -4307,7 +4287,7 @@
               <a:t>cosg</a:t>
             </a:r>
             <a:r>
-              <a:rPr lang="en-US" sz="1000" dirty="0" smtClean="0">
+              <a:rPr lang="en-US" sz="1000" dirty="0">
                 <a:solidFill>
                   <a:srgbClr val="FF0000"/>
                 </a:solidFill>
@@ -4317,7 +4297,7 @@
           </a:p>
           <a:p>
             <a:r>
-              <a:rPr lang="en-US" sz="1000" dirty="0" smtClean="0">
+              <a:rPr lang="en-US" sz="1000" dirty="0">
                 <a:solidFill>
                   <a:srgbClr val="FF0000"/>
                 </a:solidFill>
@@ -4327,7 +4307,7 @@
           </a:p>
           <a:p>
             <a:r>
-              <a:rPr lang="en-US" sz="1000" dirty="0" smtClean="0">
+              <a:rPr lang="en-US" sz="1000" dirty="0">
                 <a:solidFill>
                   <a:srgbClr val="FF0000"/>
                 </a:solidFill>
@@ -4337,7 +4317,7 @@
           </a:p>
           <a:p>
             <a:r>
-              <a:rPr lang="en-US" sz="1000" dirty="0" err="1" smtClean="0">
+              <a:rPr lang="en-US" sz="1000" dirty="0" err="1">
                 <a:solidFill>
                   <a:srgbClr val="FF0000"/>
                 </a:solidFill>
@@ -4345,7 +4325,7 @@
               <a:t>cotg</a:t>
             </a:r>
             <a:r>
-              <a:rPr lang="en-US" sz="1000" dirty="0" smtClean="0">
+              <a:rPr lang="en-US" sz="1000" dirty="0">
                 <a:solidFill>
                   <a:srgbClr val="FF0000"/>
                 </a:solidFill>
@@ -4397,7 +4377,7 @@
           <a:p>
             <a:pPr algn="ctr"/>
             <a:r>
-              <a:rPr lang="en-US" sz="1000" dirty="0" err="1" smtClean="0"/>
+              <a:rPr lang="en-US" sz="1000" dirty="0" err="1"/>
               <a:t>gbnd.c</a:t>
             </a:r>
             <a:endParaRPr lang="en-US" sz="1000" dirty="0"/>
@@ -4446,7 +4426,7 @@
           <a:p>
             <a:pPr algn="ctr"/>
             <a:r>
-              <a:rPr lang="en-US" sz="1000" dirty="0" err="1" smtClean="0"/>
+              <a:rPr lang="en-US" sz="1000" dirty="0" err="1"/>
               <a:t>unum.h</a:t>
             </a:r>
             <a:endParaRPr lang="en-US" sz="1000" dirty="0"/>
@@ -4476,113 +4456,123 @@
           <a:lstStyle/>
           <a:p>
             <a:r>
-              <a:rPr lang="en-US" sz="1000" dirty="0" smtClean="0"/>
+              <a:rPr lang="en-US" sz="1000" dirty="0"/>
               <a:t>unum</a:t>
             </a:r>
           </a:p>
           <a:p>
             <a:r>
-              <a:rPr lang="en-US" sz="1000" dirty="0" err="1" smtClean="0"/>
+              <a:rPr lang="en-US" sz="1000" dirty="0" err="1"/>
               <a:t>ubnd</a:t>
             </a:r>
-            <a:endParaRPr lang="en-US" sz="1000" dirty="0" smtClean="0"/>
-          </a:p>
-          <a:p>
             <a:endParaRPr lang="en-US" sz="1000" dirty="0"/>
           </a:p>
           <a:p>
-            <a:r>
-              <a:rPr lang="en-US" sz="1000" dirty="0" err="1" smtClean="0"/>
+            <a:endParaRPr lang="en-US" sz="1000" dirty="0"/>
+          </a:p>
+          <a:p>
+            <a:r>
+              <a:rPr lang="en-US" sz="1000" dirty="0" err="1"/>
               <a:t>unum_set</a:t>
             </a:r>
             <a:r>
-              <a:rPr lang="en-US" sz="1000" dirty="0" smtClean="0"/>
-              <a:t>()</a:t>
-            </a:r>
-          </a:p>
-          <a:p>
-            <a:r>
-              <a:rPr lang="en-US" sz="1000" dirty="0" err="1" smtClean="0"/>
+              <a:rPr lang="en-US" sz="1000" dirty="0"/>
+              <a:t>()</a:t>
+            </a:r>
+          </a:p>
+          <a:p>
+            <a:r>
+              <a:rPr lang="en-US" sz="1000" dirty="0" err="1"/>
               <a:t>unum_set_ui</a:t>
             </a:r>
             <a:r>
-              <a:rPr lang="en-US" sz="1000" dirty="0" smtClean="0"/>
-              <a:t>()</a:t>
-            </a:r>
+              <a:rPr lang="en-US" sz="1000" dirty="0"/>
+              <a:t>()</a:t>
+            </a:r>
+          </a:p>
+          <a:p>
+            <a:r>
+              <a:rPr lang="en-US" sz="1000" dirty="0" err="1"/>
+              <a:t>unum_set_si</a:t>
+            </a:r>
+            <a:r>
+              <a:rPr lang="en-US" sz="1000" dirty="0"/>
+              <a:t>()</a:t>
+            </a:r>
+          </a:p>
+          <a:p>
+            <a:r>
+              <a:rPr lang="en-US" sz="1000" dirty="0" err="1"/>
+              <a:t>unum_set_d</a:t>
+            </a:r>
+            <a:r>
+              <a:rPr lang="en-US" sz="1000" dirty="0"/>
+              <a:t>()</a:t>
+            </a:r>
+          </a:p>
+          <a:p>
+            <a:r>
+              <a:rPr lang="en-US" sz="1000" dirty="0" err="1"/>
+              <a:t>unum_set_str</a:t>
+            </a:r>
+            <a:r>
+              <a:rPr lang="en-US" sz="1000" dirty="0"/>
+              <a:t>()</a:t>
+            </a:r>
+          </a:p>
+          <a:p>
             <a:endParaRPr lang="en-US" sz="1000" dirty="0"/>
           </a:p>
           <a:p>
             <a:r>
-              <a:rPr lang="en-US" sz="1000" dirty="0" err="1" smtClean="0"/>
-              <a:t>unum_set_si</a:t>
-            </a:r>
-            <a:r>
-              <a:rPr lang="en-US" sz="1000" dirty="0" smtClean="0"/>
-              <a:t>()</a:t>
-            </a:r>
-          </a:p>
-          <a:p>
-            <a:r>
-              <a:rPr lang="en-US" sz="1000" dirty="0" err="1" smtClean="0"/>
-              <a:t>unum_set_d</a:t>
-            </a:r>
-            <a:r>
-              <a:rPr lang="en-US" sz="1000" dirty="0" smtClean="0"/>
-              <a:t>()</a:t>
-            </a:r>
-          </a:p>
-          <a:p>
-            <a:r>
-              <a:rPr lang="en-US" sz="1000" dirty="0" err="1" smtClean="0"/>
-              <a:t>unum_set_str</a:t>
-            </a:r>
-            <a:r>
-              <a:rPr lang="en-US" sz="1000" dirty="0" smtClean="0"/>
-              <a:t>()</a:t>
-            </a:r>
-          </a:p>
-          <a:p>
-            <a:endParaRPr lang="en-US" sz="1000" dirty="0" smtClean="0"/>
-          </a:p>
-          <a:p>
-            <a:r>
-              <a:rPr lang="en-US" sz="1000" dirty="0" err="1" smtClean="0"/>
+              <a:rPr lang="en-US" sz="1000" dirty="0" err="1"/>
               <a:t>unum_get_si</a:t>
             </a:r>
             <a:r>
-              <a:rPr lang="en-US" sz="1000" dirty="0" smtClean="0"/>
-              <a:t>()</a:t>
-            </a:r>
-          </a:p>
-          <a:p>
-            <a:r>
-              <a:rPr lang="en-US" sz="1000" dirty="0" err="1" smtClean="0"/>
+              <a:rPr lang="en-US" sz="1000" dirty="0"/>
+              <a:t>()</a:t>
+            </a:r>
+          </a:p>
+          <a:p>
+            <a:r>
+              <a:rPr lang="en-US" sz="1000" dirty="0" err="1"/>
               <a:t>unum_get_d</a:t>
             </a:r>
             <a:r>
-              <a:rPr lang="en-US" sz="1000" dirty="0" smtClean="0"/>
-              <a:t>()</a:t>
-            </a:r>
+              <a:rPr lang="en-US" sz="1000" dirty="0"/>
+              <a:t>()</a:t>
+            </a:r>
+          </a:p>
+          <a:p>
+            <a:r>
+              <a:rPr lang="en-US" sz="1000" dirty="0" err="1"/>
+              <a:t>unum_get_str</a:t>
+            </a:r>
+            <a:r>
+              <a:rPr lang="en-US" sz="1000" dirty="0"/>
+              <a:t>()</a:t>
+            </a:r>
+          </a:p>
+          <a:p>
             <a:endParaRPr lang="en-US" sz="1000" dirty="0"/>
           </a:p>
           <a:p>
             <a:r>
-              <a:rPr lang="en-US" sz="1000" dirty="0" err="1" smtClean="0"/>
-              <a:t>unum_get_str</a:t>
-            </a:r>
-            <a:r>
-              <a:rPr lang="en-US" sz="1000" dirty="0" smtClean="0"/>
-              <a:t>()</a:t>
-            </a:r>
+              <a:rPr lang="en-US" sz="1000" dirty="0" err="1"/>
+              <a:t>unum_nbits</a:t>
+            </a:r>
+            <a:r>
+              <a:rPr lang="en-US" sz="1000" dirty="0"/>
+              <a:t>()</a:t>
+            </a:r>
+          </a:p>
+          <a:p>
             <a:endParaRPr lang="en-US" sz="1000" dirty="0"/>
           </a:p>
           <a:p>
-            <a:endParaRPr lang="en-US" sz="1000" dirty="0" smtClean="0"/>
-          </a:p>
-          <a:p>
-            <a:r>
-              <a:rPr lang="en-US" sz="1000" dirty="0" err="1"/>
-              <a:t>unum_nbits</a:t>
+            <a:r>
+              <a:rPr lang="en-US" sz="1000" dirty="0" err="1"/>
+              <a:t>unum_cmp</a:t>
             </a:r>
             <a:r>
               <a:rPr lang="en-US" sz="1000" dirty="0"/>
@@ -4594,59 +4584,46 @@
           </a:p>
           <a:p>
             <a:r>
-              <a:rPr lang="en-US" sz="1000" dirty="0" err="1" smtClean="0"/>
-              <a:t>unum_cmp</a:t>
-            </a:r>
-            <a:r>
-              <a:rPr lang="en-US" sz="1000" dirty="0" smtClean="0"/>
-              <a:t>()</a:t>
-            </a:r>
-          </a:p>
-          <a:p>
-            <a:endParaRPr lang="en-US" sz="1000" dirty="0" smtClean="0"/>
-          </a:p>
-          <a:p>
-            <a:r>
-              <a:rPr lang="en-US" sz="1000" dirty="0" err="1" smtClean="0"/>
+              <a:rPr lang="en-US" sz="1000" dirty="0" err="1"/>
               <a:t>unum_add</a:t>
             </a:r>
             <a:r>
-              <a:rPr lang="en-US" sz="1000" dirty="0" smtClean="0"/>
-              <a:t>()</a:t>
-            </a:r>
-          </a:p>
-          <a:p>
-            <a:r>
-              <a:rPr lang="en-US" sz="1000" dirty="0" err="1" smtClean="0"/>
+              <a:rPr lang="en-US" sz="1000" dirty="0"/>
+              <a:t>()</a:t>
+            </a:r>
+          </a:p>
+          <a:p>
+            <a:r>
+              <a:rPr lang="en-US" sz="1000" dirty="0" err="1"/>
               <a:t>unum_sub</a:t>
             </a:r>
             <a:r>
-              <a:rPr lang="en-US" sz="1000" dirty="0" smtClean="0"/>
-              <a:t>()</a:t>
-            </a:r>
-          </a:p>
-          <a:p>
-            <a:r>
-              <a:rPr lang="en-US" sz="1000" dirty="0" err="1" smtClean="0"/>
+              <a:rPr lang="en-US" sz="1000" dirty="0"/>
+              <a:t>()</a:t>
+            </a:r>
+          </a:p>
+          <a:p>
+            <a:r>
+              <a:rPr lang="en-US" sz="1000" dirty="0" err="1"/>
               <a:t>unum_mul</a:t>
             </a:r>
             <a:r>
-              <a:rPr lang="en-US" sz="1000" dirty="0" smtClean="0"/>
-              <a:t>()</a:t>
-            </a:r>
-          </a:p>
-          <a:p>
-            <a:r>
-              <a:rPr lang="en-US" sz="1000" dirty="0" err="1" smtClean="0"/>
+              <a:rPr lang="en-US" sz="1000" dirty="0"/>
+              <a:t>()</a:t>
+            </a:r>
+          </a:p>
+          <a:p>
+            <a:r>
+              <a:rPr lang="en-US" sz="1000" dirty="0" err="1"/>
               <a:t>unum_div</a:t>
             </a:r>
             <a:r>
-              <a:rPr lang="en-US" sz="1000" dirty="0" smtClean="0"/>
-              <a:t>()</a:t>
-            </a:r>
-          </a:p>
-          <a:p>
-            <a:endParaRPr lang="en-US" sz="1000" dirty="0" smtClean="0"/>
+              <a:rPr lang="en-US" sz="1000" dirty="0"/>
+              <a:t>()</a:t>
+            </a:r>
+          </a:p>
+          <a:p>
+            <a:endParaRPr lang="en-US" sz="1000" dirty="0"/>
           </a:p>
           <a:p>
             <a:r>
@@ -4658,7 +4635,7 @@
               <a:t>unum_pow</a:t>
             </a:r>
             <a:r>
-              <a:rPr lang="en-US" sz="1000" dirty="0" smtClean="0">
+              <a:rPr lang="en-US" sz="1000" dirty="0">
                 <a:solidFill>
                   <a:srgbClr val="FF0000"/>
                 </a:solidFill>
@@ -4668,61 +4645,60 @@
           </a:p>
           <a:p>
             <a:r>
-              <a:rPr lang="en-US" sz="1000" dirty="0" err="1" smtClean="0"/>
+              <a:rPr lang="en-US" sz="1000" dirty="0" err="1"/>
               <a:t>unum_sq</a:t>
             </a:r>
             <a:r>
-              <a:rPr lang="en-US" sz="1000" dirty="0" smtClean="0"/>
-              <a:t>()</a:t>
-            </a:r>
+              <a:rPr lang="en-US" sz="1000" dirty="0"/>
+              <a:t>()</a:t>
+            </a:r>
+          </a:p>
+          <a:p>
+            <a:r>
+              <a:rPr lang="en-US" sz="1000" dirty="0" err="1"/>
+              <a:t>unum_sqrt</a:t>
+            </a:r>
+            <a:r>
+              <a:rPr lang="en-US" sz="1000" dirty="0"/>
+              <a:t>()</a:t>
+            </a:r>
+          </a:p>
+          <a:p>
+            <a:r>
+              <a:rPr lang="en-US" sz="1000" dirty="0" err="1"/>
+              <a:t>unum_neg</a:t>
+            </a:r>
+            <a:r>
+              <a:rPr lang="en-US" sz="1000" dirty="0"/>
+              <a:t>()</a:t>
+            </a:r>
+          </a:p>
+          <a:p>
+            <a:r>
+              <a:rPr lang="en-US" sz="1000" dirty="0" err="1"/>
+              <a:t>unum_abs</a:t>
+            </a:r>
+            <a:r>
+              <a:rPr lang="en-US" sz="1000" dirty="0"/>
+              <a:t>()</a:t>
+            </a:r>
+          </a:p>
+          <a:p>
+            <a:r>
+              <a:rPr lang="en-US" sz="1000" dirty="0" err="1"/>
+              <a:t>unum_guess</a:t>
+            </a:r>
+            <a:r>
+              <a:rPr lang="en-US" sz="1000" dirty="0"/>
+              <a:t>()</a:t>
+            </a:r>
+          </a:p>
+          <a:p>
             <a:endParaRPr lang="en-US" sz="1000" dirty="0"/>
           </a:p>
           <a:p>
             <a:r>
-              <a:rPr lang="en-US" sz="1000" dirty="0" err="1" smtClean="0"/>
-              <a:t>unum_sqrt</a:t>
-            </a:r>
-            <a:r>
-              <a:rPr lang="en-US" sz="1000" dirty="0"/>
-              <a:t>()</a:t>
-            </a:r>
-          </a:p>
-          <a:p>
-            <a:r>
-              <a:rPr lang="en-US" sz="1000" dirty="0" err="1" smtClean="0"/>
-              <a:t>unum_neg</a:t>
-            </a:r>
-            <a:r>
-              <a:rPr lang="en-US" sz="1000" dirty="0" smtClean="0"/>
-              <a:t>()</a:t>
-            </a:r>
-          </a:p>
-          <a:p>
-            <a:r>
-              <a:rPr lang="en-US" sz="1000" dirty="0" err="1" smtClean="0"/>
-              <a:t>unum_abs</a:t>
-            </a:r>
-            <a:r>
-              <a:rPr lang="en-US" sz="1000" dirty="0" smtClean="0"/>
-              <a:t>()</a:t>
-            </a:r>
-          </a:p>
-          <a:p>
-            <a:r>
-              <a:rPr lang="en-US" sz="1000" dirty="0" err="1" smtClean="0"/>
-              <a:t>unum_guess</a:t>
-            </a:r>
-            <a:r>
-              <a:rPr lang="en-US" sz="1000" dirty="0"/>
-              <a:t>()</a:t>
-            </a:r>
-          </a:p>
-          <a:p>
-            <a:endParaRPr lang="en-US" sz="1000" dirty="0"/>
-          </a:p>
-          <a:p>
-            <a:r>
-              <a:rPr lang="en-US" sz="1000" dirty="0" smtClean="0">
+              <a:rPr lang="en-US" sz="1000" dirty="0">
                 <a:solidFill>
                   <a:srgbClr val="FF0000"/>
                 </a:solidFill>
@@ -4731,15 +4707,40 @@
             </a:r>
           </a:p>
           <a:p>
-            <a:endParaRPr lang="en-US" sz="1000" dirty="0" smtClean="0"/>
-          </a:p>
-          <a:p>
-            <a:r>
-              <a:rPr lang="en-US" sz="1000" dirty="0" err="1" smtClean="0"/>
+            <a:r>
+              <a:rPr lang="en-US" sz="1000" dirty="0">
+                <a:solidFill>
+                  <a:srgbClr val="FF0000"/>
+                </a:solidFill>
+              </a:rPr>
+              <a:t>Fused</a:t>
+            </a:r>
+          </a:p>
+          <a:p>
+            <a:r>
+              <a:rPr lang="en-US" sz="1000" dirty="0" err="1">
+                <a:solidFill>
+                  <a:srgbClr val="FF0000"/>
+                </a:solidFill>
+              </a:rPr>
+              <a:t>ComplexFFT</a:t>
+            </a:r>
+            <a:endParaRPr lang="en-US" sz="1000" dirty="0">
+              <a:solidFill>
+                <a:srgbClr val="FF0000"/>
+              </a:solidFill>
+            </a:endParaRPr>
+          </a:p>
+          <a:p>
+            <a:endParaRPr lang="en-US" sz="1000" dirty="0"/>
+          </a:p>
+          <a:p>
+            <a:r>
+              <a:rPr lang="en-US" sz="1000" dirty="0" err="1"/>
               <a:t>ubnd</a:t>
             </a:r>
             <a:r>
-              <a:rPr lang="en-US" sz="1000" dirty="0" smtClean="0"/>
+              <a:rPr lang="en-US" sz="1000" dirty="0"/>
               <a:t>_*()</a:t>
             </a:r>
           </a:p>
@@ -4787,7 +4788,7 @@
           <a:p>
             <a:pPr algn="ctr"/>
             <a:r>
-              <a:rPr lang="en-US" sz="1000" dirty="0" err="1" smtClean="0"/>
+              <a:rPr lang="en-US" sz="1000" dirty="0" err="1"/>
               <a:t>unum.c</a:t>
             </a:r>
             <a:endParaRPr lang="en-US" sz="1000" dirty="0"/>
@@ -4836,7 +4837,7 @@
           <a:p>
             <a:pPr algn="ctr"/>
             <a:r>
-              <a:rPr lang="en-US" sz="1000" dirty="0" err="1" smtClean="0"/>
+              <a:rPr lang="en-US" sz="1000" dirty="0" err="1"/>
               <a:t>ulayer.c</a:t>
             </a:r>
             <a:endParaRPr lang="en-US" sz="1000" dirty="0"/>
@@ -4885,7 +4886,7 @@
           <a:p>
             <a:pPr algn="ctr"/>
             <a:r>
-              <a:rPr lang="en-US" sz="1000" dirty="0" err="1" smtClean="0"/>
+              <a:rPr lang="en-US" sz="1000" dirty="0" err="1"/>
               <a:t>glayer.c</a:t>
             </a:r>
             <a:endParaRPr lang="en-US" sz="1000" dirty="0"/>
@@ -4934,7 +4935,7 @@
           <a:p>
             <a:pPr algn="ctr"/>
             <a:r>
-              <a:rPr lang="en-US" sz="1000" dirty="0" err="1" smtClean="0"/>
+              <a:rPr lang="en-US" sz="1000" dirty="0" err="1"/>
               <a:t>conv.h</a:t>
             </a:r>
             <a:endParaRPr lang="en-US" sz="1000" dirty="0"/>
@@ -4965,83 +4966,73 @@
           <a:p>
             <a:r>
               <a:rPr lang="en-US" sz="1000" dirty="0"/>
-              <a:t>*</a:t>
-            </a:r>
-            <a:r>
-              <a:rPr lang="en-US" sz="1000" dirty="0" smtClean="0"/>
-              <a:t>2g() – </a:t>
-            </a:r>
-            <a:r>
-              <a:rPr lang="en-US" sz="1000" dirty="0" err="1" smtClean="0"/>
+              <a:t>*2g() – </a:t>
+            </a:r>
+            <a:r>
+              <a:rPr lang="en-US" sz="1000" dirty="0" err="1"/>
               <a:t>si,ui,d,f</a:t>
             </a:r>
             <a:endParaRPr lang="en-US" sz="1000" dirty="0"/>
           </a:p>
           <a:p>
             <a:r>
-              <a:rPr lang="en-US" sz="1000" dirty="0" smtClean="0"/>
-              <a:t>g2</a:t>
-            </a:r>
-            <a:r>
-              <a:rPr lang="en-US" sz="1000" dirty="0"/>
-              <a:t>*()</a:t>
-            </a:r>
-          </a:p>
-          <a:p>
-            <a:endParaRPr lang="en-US" sz="1000" dirty="0" smtClean="0"/>
-          </a:p>
-          <a:p>
-            <a:r>
-              <a:rPr lang="en-US" sz="1000" dirty="0" smtClean="0"/>
-              <a:t>*2un()</a:t>
-            </a:r>
-            <a:r>
-              <a:rPr lang="en-US" sz="1000" dirty="0"/>
-              <a:t> – </a:t>
-            </a:r>
-            <a:r>
-              <a:rPr lang="en-US" sz="1000" dirty="0" err="1" smtClean="0"/>
+              <a:rPr lang="en-US" sz="1000" dirty="0"/>
+              <a:t>g2*()</a:t>
+            </a:r>
+          </a:p>
+          <a:p>
+            <a:endParaRPr lang="en-US" sz="1000" dirty="0"/>
+          </a:p>
+          <a:p>
+            <a:r>
+              <a:rPr lang="en-US" sz="1000" dirty="0"/>
+              <a:t>*2un() – </a:t>
+            </a:r>
+            <a:r>
+              <a:rPr lang="en-US" sz="1000" dirty="0" err="1"/>
               <a:t>si,ui,d</a:t>
             </a:r>
             <a:endParaRPr lang="en-US" sz="1000" dirty="0"/>
           </a:p>
           <a:p>
             <a:r>
-              <a:rPr lang="en-US" sz="1000" dirty="0" smtClean="0"/>
+              <a:rPr lang="en-US" sz="1000" dirty="0"/>
               <a:t>un2*()</a:t>
             </a:r>
+          </a:p>
+          <a:p>
             <a:endParaRPr lang="en-US" sz="1000" dirty="0"/>
           </a:p>
           <a:p>
+            <a:r>
+              <a:rPr lang="en-US" sz="1000" dirty="0"/>
+              <a:t>*2ub() – </a:t>
+            </a:r>
+            <a:r>
+              <a:rPr lang="en-US" sz="1000" dirty="0" err="1"/>
+              <a:t>si,ui,d</a:t>
+            </a:r>
             <a:endParaRPr lang="en-US" sz="1000" dirty="0"/>
           </a:p>
           <a:p>
             <a:r>
               <a:rPr lang="en-US" sz="1000" dirty="0"/>
-              <a:t>*</a:t>
-            </a:r>
-            <a:r>
-              <a:rPr lang="en-US" sz="1000" dirty="0" smtClean="0"/>
-              <a:t>2ub()</a:t>
-            </a:r>
-            <a:r>
-              <a:rPr lang="en-US" sz="1000" dirty="0"/>
-              <a:t> – </a:t>
-            </a:r>
-            <a:r>
-              <a:rPr lang="en-US" sz="1000" dirty="0" err="1" smtClean="0"/>
-              <a:t>si,ui,d</a:t>
-            </a:r>
+              <a:t>ub2*()</a:t>
+            </a:r>
+          </a:p>
+          <a:p>
             <a:endParaRPr lang="en-US" sz="1000" dirty="0"/>
           </a:p>
           <a:p>
             <a:r>
-              <a:rPr lang="en-US" sz="1000" dirty="0" smtClean="0"/>
-              <a:t>ub2</a:t>
-            </a:r>
-            <a:r>
-              <a:rPr lang="en-US" sz="1000" dirty="0"/>
-              <a:t>*()</a:t>
+              <a:rPr lang="en-US" sz="1000" dirty="0"/>
+              <a:t>u2f()</a:t>
+            </a:r>
+          </a:p>
+          <a:p>
+            <a:r>
+              <a:rPr lang="en-US" sz="1000" dirty="0"/>
+              <a:t>f2u()</a:t>
             </a:r>
           </a:p>
           <a:p>
@@ -5049,18 +5040,26 @@
           </a:p>
           <a:p>
             <a:r>
-              <a:rPr lang="en-US" sz="1000" dirty="0" smtClean="0"/>
-              <a:t>u2f</a:t>
-            </a:r>
-            <a:r>
-              <a:rPr lang="en-US" sz="1000" dirty="0"/>
-              <a:t>()</a:t>
-            </a:r>
-          </a:p>
-          <a:p>
-            <a:r>
-              <a:rPr lang="en-US" sz="1000" dirty="0"/>
-              <a:t>f2u()</a:t>
+              <a:rPr lang="en-US" sz="1000" dirty="0"/>
+              <a:t>unum2g()</a:t>
+            </a:r>
+          </a:p>
+          <a:p>
+            <a:r>
+              <a:rPr lang="en-US" sz="1000" dirty="0"/>
+              <a:t>ubnd2g()</a:t>
+            </a:r>
+          </a:p>
+          <a:p>
+            <a:r>
+              <a:rPr lang="en-US" sz="1000" dirty="0"/>
+              <a:t>u2g()</a:t>
+            </a:r>
+          </a:p>
+          <a:p>
+            <a:r>
+              <a:rPr lang="en-US" sz="1000" dirty="0"/>
+              <a:t>g2u()</a:t>
             </a:r>
           </a:p>
           <a:p>
@@ -5068,40 +5067,13 @@
           </a:p>
           <a:p>
             <a:r>
-              <a:rPr lang="en-US" sz="1000" dirty="0" smtClean="0"/>
-              <a:t>unum2g()</a:t>
-            </a:r>
-          </a:p>
-          <a:p>
-            <a:r>
-              <a:rPr lang="en-US" sz="1000" dirty="0" smtClean="0"/>
-              <a:t>ubnd2g()</a:t>
-            </a:r>
-          </a:p>
-          <a:p>
-            <a:r>
-              <a:rPr lang="en-US" sz="1000" dirty="0" smtClean="0"/>
-              <a:t>u2g()</a:t>
-            </a:r>
-          </a:p>
-          <a:p>
-            <a:r>
-              <a:rPr lang="en-US" sz="1000" dirty="0" smtClean="0"/>
-              <a:t>g2u()</a:t>
-            </a:r>
-          </a:p>
-          <a:p>
-            <a:endParaRPr lang="en-US" sz="1000" dirty="0" smtClean="0"/>
-          </a:p>
-          <a:p>
-            <a:r>
-              <a:rPr lang="en-US" sz="1000" dirty="0" smtClean="0"/>
+              <a:rPr lang="en-US" sz="1000" dirty="0"/>
               <a:t>unify()</a:t>
             </a:r>
           </a:p>
           <a:p>
             <a:r>
-              <a:rPr lang="en-US" sz="1000" dirty="0" err="1" smtClean="0">
+              <a:rPr lang="en-US" sz="1000" dirty="0" err="1">
                 <a:solidFill>
                   <a:srgbClr val="FF0000"/>
                 </a:solidFill>
@@ -5109,7 +5081,7 @@
               <a:t>smartunify</a:t>
             </a:r>
             <a:r>
-              <a:rPr lang="en-US" sz="1000" dirty="0" smtClean="0">
+              <a:rPr lang="en-US" sz="1000" dirty="0">
                 <a:solidFill>
                   <a:srgbClr val="FF0000"/>
                 </a:solidFill>
@@ -5119,11 +5091,11 @@
           </a:p>
           <a:p>
             <a:r>
-              <a:rPr lang="en-US" sz="1000" dirty="0" err="1" smtClean="0"/>
+              <a:rPr lang="en-US" sz="1000" dirty="0" err="1"/>
               <a:t>guessu</a:t>
             </a:r>
             <a:r>
-              <a:rPr lang="en-US" sz="1000" dirty="0" smtClean="0"/>
+              <a:rPr lang="en-US" sz="1000" dirty="0"/>
               <a:t>()</a:t>
             </a:r>
           </a:p>
@@ -5171,7 +5143,7 @@
           <a:p>
             <a:pPr algn="ctr"/>
             <a:r>
-              <a:rPr lang="en-US" sz="1000" dirty="0" err="1" smtClean="0"/>
+              <a:rPr lang="en-US" sz="1000" dirty="0" err="1"/>
               <a:t>conv.c</a:t>
             </a:r>
             <a:endParaRPr lang="en-US" sz="1000" dirty="0"/>
@@ -5220,7 +5192,7 @@
           <a:p>
             <a:pPr algn="ctr"/>
             <a:r>
-              <a:rPr lang="en-US" sz="1000" dirty="0" err="1" smtClean="0"/>
+              <a:rPr lang="en-US" sz="1000" dirty="0" err="1"/>
               <a:t>support.h</a:t>
             </a:r>
             <a:endParaRPr lang="en-US" sz="1000" dirty="0"/>
@@ -5256,132 +5228,132 @@
             <a:endParaRPr lang="en-US" sz="1000" dirty="0"/>
           </a:p>
           <a:p>
-            <a:endParaRPr lang="en-US" sz="1000" dirty="0" smtClean="0"/>
-          </a:p>
-          <a:p>
-            <a:r>
-              <a:rPr lang="en-US" sz="1000" dirty="0" err="1" smtClean="0"/>
+            <a:endParaRPr lang="en-US" sz="1000" dirty="0"/>
+          </a:p>
+          <a:p>
+            <a:r>
+              <a:rPr lang="en-US" sz="1000" dirty="0" err="1"/>
               <a:t>utag</a:t>
             </a:r>
             <a:r>
-              <a:rPr lang="en-US" sz="1000" dirty="0" smtClean="0"/>
-              <a:t>()</a:t>
-            </a:r>
-          </a:p>
-          <a:p>
-            <a:r>
-              <a:rPr lang="en-US" sz="1000" dirty="0" err="1" smtClean="0"/>
+              <a:rPr lang="en-US" sz="1000" dirty="0"/>
+              <a:t>()</a:t>
+            </a:r>
+          </a:p>
+          <a:p>
+            <a:r>
+              <a:rPr lang="en-US" sz="1000" dirty="0" err="1"/>
               <a:t>signmask</a:t>
             </a:r>
             <a:r>
-              <a:rPr lang="en-US" sz="1000" dirty="0" smtClean="0"/>
-              <a:t>()</a:t>
-            </a:r>
-          </a:p>
-          <a:p>
-            <a:r>
-              <a:rPr lang="en-US" sz="1000" dirty="0" err="1" smtClean="0"/>
+              <a:rPr lang="en-US" sz="1000" dirty="0"/>
+              <a:t>()</a:t>
+            </a:r>
+          </a:p>
+          <a:p>
+            <a:r>
+              <a:rPr lang="en-US" sz="1000" dirty="0" err="1"/>
               <a:t>bigu</a:t>
             </a:r>
             <a:r>
-              <a:rPr lang="en-US" sz="1000" dirty="0" smtClean="0"/>
-              <a:t>()</a:t>
-            </a:r>
-          </a:p>
-          <a:p>
-            <a:endParaRPr lang="en-US" sz="1000" dirty="0" smtClean="0"/>
-          </a:p>
-          <a:p>
-            <a:r>
-              <a:rPr lang="en-US" sz="1000" dirty="0" smtClean="0"/>
+              <a:rPr lang="en-US" sz="1000" dirty="0"/>
+              <a:t>()</a:t>
+            </a:r>
+          </a:p>
+          <a:p>
+            <a:endParaRPr lang="en-US" sz="1000" dirty="0"/>
+          </a:p>
+          <a:p>
+            <a:r>
+              <a:rPr lang="en-US" sz="1000" dirty="0"/>
               <a:t>scale()</a:t>
             </a:r>
           </a:p>
           <a:p>
             <a:r>
-              <a:rPr lang="en-US" sz="1000" dirty="0" smtClean="0"/>
+              <a:rPr lang="en-US" sz="1000" dirty="0"/>
               <a:t>ne()</a:t>
             </a:r>
           </a:p>
           <a:p>
-            <a:endParaRPr lang="en-US" sz="1000" dirty="0" smtClean="0"/>
-          </a:p>
-          <a:p>
-            <a:r>
-              <a:rPr lang="en-US" sz="1000" dirty="0" err="1" smtClean="0"/>
+            <a:endParaRPr lang="en-US" sz="1000" dirty="0"/>
+          </a:p>
+          <a:p>
+            <a:r>
+              <a:rPr lang="en-US" sz="1000" dirty="0" err="1"/>
               <a:t>inexQ</a:t>
             </a:r>
             <a:r>
-              <a:rPr lang="en-US" sz="1000" dirty="0" smtClean="0"/>
-              <a:t>()</a:t>
-            </a:r>
-          </a:p>
-          <a:p>
-            <a:r>
-              <a:rPr lang="en-US" sz="1000" dirty="0" err="1" smtClean="0"/>
+              <a:rPr lang="en-US" sz="1000" dirty="0"/>
+              <a:t>()</a:t>
+            </a:r>
+          </a:p>
+          <a:p>
+            <a:r>
+              <a:rPr lang="en-US" sz="1000" dirty="0" err="1"/>
               <a:t>infuQ</a:t>
             </a:r>
             <a:r>
-              <a:rPr lang="en-US" sz="1000" dirty="0" smtClean="0"/>
-              <a:t>()</a:t>
-            </a:r>
-          </a:p>
-          <a:p>
-            <a:r>
-              <a:rPr lang="en-US" sz="1000" dirty="0" err="1" smtClean="0"/>
+              <a:rPr lang="en-US" sz="1000" dirty="0"/>
+              <a:t>()</a:t>
+            </a:r>
+          </a:p>
+          <a:p>
+            <a:r>
+              <a:rPr lang="en-US" sz="1000" dirty="0" err="1"/>
               <a:t>nanuQ</a:t>
             </a:r>
             <a:r>
-              <a:rPr lang="en-US" sz="1000" dirty="0" smtClean="0"/>
-              <a:t>()</a:t>
-            </a:r>
-          </a:p>
-          <a:p>
-            <a:endParaRPr lang="en-US" sz="1000" dirty="0" smtClean="0"/>
-          </a:p>
-          <a:p>
-            <a:r>
-              <a:rPr lang="en-US" sz="1000" dirty="0" err="1" smtClean="0"/>
+              <a:rPr lang="en-US" sz="1000" dirty="0"/>
+              <a:t>()</a:t>
+            </a:r>
+          </a:p>
+          <a:p>
+            <a:endParaRPr lang="en-US" sz="1000" dirty="0"/>
+          </a:p>
+          <a:p>
+            <a:r>
+              <a:rPr lang="en-US" sz="1000" dirty="0" err="1"/>
               <a:t>promotef</a:t>
             </a:r>
             <a:r>
-              <a:rPr lang="en-US" sz="1000" dirty="0" smtClean="0"/>
-              <a:t>()</a:t>
-            </a:r>
-          </a:p>
-          <a:p>
-            <a:r>
-              <a:rPr lang="en-US" sz="1000" dirty="0" err="1" smtClean="0"/>
+              <a:rPr lang="en-US" sz="1000" dirty="0"/>
+              <a:t>()</a:t>
+            </a:r>
+          </a:p>
+          <a:p>
+            <a:r>
+              <a:rPr lang="en-US" sz="1000" dirty="0" err="1"/>
               <a:t>promotee</a:t>
             </a:r>
             <a:r>
-              <a:rPr lang="en-US" sz="1000" dirty="0" smtClean="0"/>
-              <a:t>()</a:t>
-            </a:r>
-          </a:p>
-          <a:p>
-            <a:r>
-              <a:rPr lang="en-US" sz="1000" dirty="0" smtClean="0"/>
+              <a:rPr lang="en-US" sz="1000" dirty="0"/>
+              <a:t>()</a:t>
+            </a:r>
+          </a:p>
+          <a:p>
+            <a:r>
+              <a:rPr lang="en-US" sz="1000" dirty="0"/>
               <a:t>promote()</a:t>
             </a:r>
           </a:p>
           <a:p>
             <a:r>
-              <a:rPr lang="en-US" sz="1000" dirty="0" err="1" smtClean="0"/>
+              <a:rPr lang="en-US" sz="1000" dirty="0" err="1"/>
               <a:t>demotef</a:t>
             </a:r>
             <a:r>
-              <a:rPr lang="en-US" sz="1000" dirty="0" smtClean="0"/>
-              <a:t>()</a:t>
-            </a:r>
-          </a:p>
-          <a:p>
-            <a:r>
-              <a:rPr lang="en-US" sz="1000" dirty="0" err="1" smtClean="0"/>
+              <a:rPr lang="en-US" sz="1000" dirty="0"/>
+              <a:t>()</a:t>
+            </a:r>
+          </a:p>
+          <a:p>
+            <a:r>
+              <a:rPr lang="en-US" sz="1000" dirty="0" err="1"/>
               <a:t>demotee</a:t>
             </a:r>
             <a:r>
-              <a:rPr lang="en-US" sz="1000" dirty="0" smtClean="0"/>
+              <a:rPr lang="en-US" sz="1000" dirty="0"/>
               <a:t>()</a:t>
             </a:r>
           </a:p>
@@ -5429,7 +5401,7 @@
           <a:p>
             <a:pPr algn="ctr"/>
             <a:r>
-              <a:rPr lang="en-US" sz="1000" dirty="0" err="1" smtClean="0"/>
+              <a:rPr lang="en-US" sz="1000" dirty="0" err="1"/>
               <a:t>support.c</a:t>
             </a:r>
             <a:endParaRPr lang="en-US" sz="1000" dirty="0"/>
@@ -5478,7 +5450,7 @@
           <a:p>
             <a:pPr algn="ctr"/>
             <a:r>
-              <a:rPr lang="en-US" sz="1000" dirty="0" err="1" smtClean="0"/>
+              <a:rPr lang="en-US" sz="1000" dirty="0" err="1"/>
               <a:t>hlayer.h</a:t>
             </a:r>
             <a:endParaRPr lang="en-US" sz="1000" dirty="0"/>
@@ -5509,30 +5481,22 @@
           <a:p>
             <a:r>
               <a:rPr lang="en-US" sz="1000" dirty="0"/>
-              <a:t>s</a:t>
-            </a:r>
-            <a:r>
-              <a:rPr lang="en-US" sz="1000" dirty="0" smtClean="0"/>
-              <a:t>can_*()</a:t>
-            </a:r>
-          </a:p>
-          <a:p>
-            <a:r>
-              <a:rPr lang="en-US" sz="1000" dirty="0"/>
-              <a:t>p</a:t>
-            </a:r>
-            <a:r>
-              <a:rPr lang="en-US" sz="1000" dirty="0" smtClean="0"/>
-              <a:t>rint_*()</a:t>
-            </a:r>
-          </a:p>
-          <a:p>
-            <a:r>
-              <a:rPr lang="en-US" sz="1000" dirty="0" err="1" smtClean="0"/>
+              <a:t>scan_*()</a:t>
+            </a:r>
+          </a:p>
+          <a:p>
+            <a:r>
+              <a:rPr lang="en-US" sz="1000" dirty="0"/>
+              <a:t>print_*()</a:t>
+            </a:r>
+          </a:p>
+          <a:p>
+            <a:r>
+              <a:rPr lang="en-US" sz="1000" dirty="0" err="1"/>
               <a:t>uview</a:t>
             </a:r>
             <a:r>
-              <a:rPr lang="en-US" sz="1000" dirty="0" smtClean="0"/>
+              <a:rPr lang="en-US" sz="1000" dirty="0"/>
               <a:t>_*()</a:t>
             </a:r>
           </a:p>
@@ -5542,10 +5506,9 @@
               <a:t>view_uenv</a:t>
             </a:r>
             <a:r>
-              <a:rPr lang="en-US" sz="1000" dirty="0" smtClean="0"/>
-              <a:t>()</a:t>
-            </a:r>
-            <a:endParaRPr lang="en-US" sz="1000" dirty="0"/>
+              <a:rPr lang="en-US" sz="1000" dirty="0"/>
+              <a:t>()</a:t>
+            </a:r>
           </a:p>
         </p:txBody>
       </p:sp>
@@ -5591,7 +5554,7 @@
           <a:p>
             <a:pPr algn="ctr"/>
             <a:r>
-              <a:rPr lang="en-US" sz="1000" dirty="0" err="1" smtClean="0"/>
+              <a:rPr lang="en-US" sz="1000" dirty="0" err="1"/>
               <a:t>hlayer.c</a:t>
             </a:r>
             <a:endParaRPr lang="en-US" sz="1000" dirty="0"/>
@@ -5640,7 +5603,7 @@
           <a:p>
             <a:pPr algn="ctr"/>
             <a:r>
-              <a:rPr lang="en-US" sz="1000" dirty="0" err="1" smtClean="0"/>
+              <a:rPr lang="en-US" sz="1000" dirty="0" err="1"/>
               <a:t>gmp.c</a:t>
             </a:r>
             <a:endParaRPr lang="en-US" sz="1000" dirty="0"/>
@@ -5689,7 +5652,7 @@
           <a:p>
             <a:pPr algn="ctr"/>
             <a:r>
-              <a:rPr lang="en-US" sz="1000" dirty="0" err="1" smtClean="0"/>
+              <a:rPr lang="en-US" sz="1000" dirty="0" err="1"/>
               <a:t>gmp.h</a:t>
             </a:r>
             <a:endParaRPr lang="en-US" sz="1000" dirty="0"/>
@@ -5720,34 +5683,30 @@
           <a:p>
             <a:r>
               <a:rPr lang="en-US" sz="1000" dirty="0" err="1"/>
-              <a:t>m</a:t>
-            </a:r>
-            <a:r>
-              <a:rPr lang="en-US" sz="1000" dirty="0" err="1" smtClean="0"/>
-              <a:t>pn</a:t>
-            </a:r>
-            <a:r>
-              <a:rPr lang="en-US" sz="1000" dirty="0" smtClean="0"/>
+              <a:t>mpn</a:t>
+            </a:r>
+            <a:r>
+              <a:rPr lang="en-US" sz="1000" dirty="0"/>
               <a:t>_*()</a:t>
             </a:r>
           </a:p>
           <a:p>
             <a:r>
-              <a:rPr lang="en-US" sz="1000" dirty="0" err="1" smtClean="0"/>
+              <a:rPr lang="en-US" sz="1000" dirty="0" err="1"/>
               <a:t>mpz</a:t>
             </a:r>
             <a:r>
-              <a:rPr lang="en-US" sz="1000" dirty="0" smtClean="0"/>
+              <a:rPr lang="en-US" sz="1000" dirty="0"/>
               <a:t>_*()</a:t>
             </a:r>
           </a:p>
           <a:p>
             <a:r>
-              <a:rPr lang="en-US" sz="1000" dirty="0" err="1" smtClean="0"/>
+              <a:rPr lang="en-US" sz="1000" dirty="0" err="1"/>
               <a:t>mpf</a:t>
             </a:r>
             <a:r>
-              <a:rPr lang="en-US" sz="1000" dirty="0" smtClean="0"/>
+              <a:rPr lang="en-US" sz="1000" dirty="0"/>
               <a:t>_*()</a:t>
             </a:r>
           </a:p>
@@ -5796,11 +5755,7 @@
             <a:pPr algn="ctr"/>
             <a:r>
               <a:rPr lang="en-US" sz="1000" dirty="0" err="1"/>
-              <a:t>g</a:t>
-            </a:r>
-            <a:r>
-              <a:rPr lang="en-US" sz="1000" dirty="0" err="1" smtClean="0"/>
-              <a:t>mp_aux.c</a:t>
+              <a:t>gmp_aux.c</a:t>
             </a:r>
             <a:endParaRPr lang="en-US" sz="1000" dirty="0"/>
           </a:p>
@@ -5849,11 +5804,7 @@
             <a:pPr algn="ctr"/>
             <a:r>
               <a:rPr lang="en-US" sz="1000" dirty="0" err="1"/>
-              <a:t>g</a:t>
-            </a:r>
-            <a:r>
-              <a:rPr lang="en-US" sz="1000" dirty="0" err="1" smtClean="0"/>
-              <a:t>mp_aux.h</a:t>
+              <a:t>gmp_aux.h</a:t>
             </a:r>
             <a:endParaRPr lang="en-US" sz="1000" dirty="0"/>
           </a:p>
@@ -5882,39 +5833,39 @@
           <a:lstStyle/>
           <a:p>
             <a:r>
-              <a:rPr lang="en-US" sz="1000" dirty="0" err="1" smtClean="0"/>
+              <a:rPr lang="en-US" sz="1000" dirty="0" err="1"/>
               <a:t>mpn</a:t>
             </a:r>
             <a:r>
-              <a:rPr lang="en-US" sz="1000" dirty="0" smtClean="0"/>
+              <a:rPr lang="en-US" sz="1000" dirty="0"/>
               <a:t>_*shift()</a:t>
             </a:r>
           </a:p>
           <a:p>
             <a:r>
-              <a:rPr lang="en-US" sz="1000" dirty="0" err="1" smtClean="0"/>
+              <a:rPr lang="en-US" sz="1000" dirty="0" err="1"/>
               <a:t>mpn</a:t>
             </a:r>
             <a:r>
-              <a:rPr lang="en-US" sz="1000" dirty="0" smtClean="0"/>
+              <a:rPr lang="en-US" sz="1000" dirty="0"/>
               <a:t>_*bit()</a:t>
             </a:r>
           </a:p>
           <a:p>
             <a:r>
-              <a:rPr lang="en-US" sz="1000" dirty="0" err="1" smtClean="0"/>
+              <a:rPr lang="en-US" sz="1000" dirty="0" err="1"/>
               <a:t>mp</a:t>
             </a:r>
             <a:r>
-              <a:rPr lang="en-US" sz="1000" dirty="0" smtClean="0"/>
+              <a:rPr lang="en-US" sz="1000" dirty="0"/>
               <a:t>*_</a:t>
             </a:r>
             <a:r>
-              <a:rPr lang="en-US" sz="1000" dirty="0" err="1" smtClean="0"/>
+              <a:rPr lang="en-US" sz="1000" dirty="0" err="1"/>
               <a:t>import_b</a:t>
             </a:r>
             <a:r>
-              <a:rPr lang="en-US" sz="1000" dirty="0" smtClean="0"/>
+              <a:rPr lang="en-US" sz="1000" dirty="0"/>
               <a:t>()</a:t>
             </a:r>
           </a:p>
@@ -5924,18 +5875,17 @@
               <a:t>mp</a:t>
             </a:r>
             <a:r>
-              <a:rPr lang="en-US" sz="1000" dirty="0" smtClean="0"/>
+              <a:rPr lang="en-US" sz="1000" dirty="0"/>
               <a:t>*_</a:t>
             </a:r>
             <a:r>
-              <a:rPr lang="en-US" sz="1000" dirty="0" err="1" smtClean="0"/>
+              <a:rPr lang="en-US" sz="1000" dirty="0" err="1"/>
               <a:t>export_b</a:t>
             </a:r>
             <a:r>
-              <a:rPr lang="en-US" sz="1000" dirty="0" smtClean="0"/>
-              <a:t>()</a:t>
-            </a:r>
-            <a:endParaRPr lang="en-US" sz="1000" dirty="0"/>
+              <a:rPr lang="en-US" sz="1000" dirty="0"/>
+              <a:t>()</a:t>
+            </a:r>
           </a:p>
         </p:txBody>
       </p:sp>
@@ -6425,7 +6375,7 @@
           <a:p>
             <a:pPr algn="ctr"/>
             <a:r>
-              <a:rPr lang="en-US" sz="1000" dirty="0" err="1" smtClean="0"/>
+              <a:rPr lang="en-US" sz="1000" dirty="0" err="1"/>
               <a:t>gmp_macro.h</a:t>
             </a:r>
             <a:endParaRPr lang="en-US" sz="1000" dirty="0"/>
@@ -6474,10 +6424,53 @@
           <a:p>
             <a:pPr algn="ctr"/>
             <a:r>
-              <a:rPr lang="en-US" sz="1000" dirty="0" err="1" smtClean="0"/>
+              <a:rPr lang="en-US" sz="1000" dirty="0" err="1"/>
               <a:t>unumxx.h</a:t>
             </a:r>
             <a:endParaRPr lang="en-US" sz="1000" dirty="0"/>
+          </a:p>
+        </p:txBody>
+      </p:sp>
+      <p:sp>
+        <p:nvSpPr>
+          <p:cNvPr id="52" name="TextBox 51">
+            <a:extLst>
+              <a:ext uri="{FF2B5EF4-FFF2-40B4-BE49-F238E27FC236}">
+                <a16:creationId xmlns:a16="http://schemas.microsoft.com/office/drawing/2014/main" id="{8D48E47B-BFC1-4F7E-962E-FD8ABE60C4EE}"/>
+              </a:ext>
+            </a:extLst>
+          </p:cNvPr>
+          <p:cNvSpPr txBox="1"/>
+          <p:nvPr/>
+        </p:nvSpPr>
+        <p:spPr>
+          <a:xfrm>
+            <a:off x="2133600" y="6336268"/>
+            <a:ext cx="5029200" cy="369332"/>
+          </a:xfrm>
+          <a:prstGeom prst="rect">
+            <a:avLst/>
+          </a:prstGeom>
+          <a:noFill/>
+        </p:spPr>
+        <p:txBody>
+          <a:bodyPr wrap="square" rtlCol="0">
+            <a:spAutoFit/>
+          </a:bodyPr>
+          <a:lstStyle/>
+          <a:p>
+            <a:r>
+              <a:rPr lang="en-US" dirty="0"/>
+              <a:t>Unum Library Module Map, </a:t>
+            </a:r>
+            <a:r>
+              <a:rPr lang="en-US" dirty="0">
+                <a:solidFill>
+                  <a:srgbClr val="FF0000"/>
+                </a:solidFill>
+              </a:rPr>
+              <a:t>Future Work in Red</a:t>
+            </a:r>
           </a:p>
         </p:txBody>
       </p:sp>

</xml_diff>